<commit_message>
Begin slide van mijn deel.
</commit_message>
<xml_diff>
--- a/NanoparticleToxicity.pptx
+++ b/NanoparticleToxicity.pptx
@@ -6,15 +6,16 @@
     <p:sldMasterId id="2147483694" r:id="rId2"/>
   </p:sldMasterIdLst>
   <p:notesMasterIdLst>
-    <p:notesMasterId r:id="rId6"/>
+    <p:notesMasterId r:id="rId7"/>
   </p:notesMasterIdLst>
   <p:handoutMasterIdLst>
-    <p:handoutMasterId r:id="rId7"/>
+    <p:handoutMasterId r:id="rId8"/>
   </p:handoutMasterIdLst>
   <p:sldIdLst>
     <p:sldId id="270" r:id="rId3"/>
     <p:sldId id="271" r:id="rId4"/>
     <p:sldId id="264" r:id="rId5"/>
+    <p:sldId id="272" r:id="rId6"/>
   </p:sldIdLst>
   <p:sldSz cx="12192000" cy="6858000"/>
   <p:notesSz cx="6858000" cy="9144000"/>
@@ -6046,6 +6047,19 @@
             <a:endParaRPr lang="nl-BE" dirty="0"/>
           </a:p>
           <a:p>
+            <a:r>
+              <a:rPr lang="nl-BE" dirty="0" err="1"/>
+              <a:t>Possible</a:t>
+            </a:r>
+            <a:r>
+              <a:rPr lang="nl-BE" dirty="0"/>
+              <a:t> Solutions</a:t>
+            </a:r>
+          </a:p>
+          <a:p>
+            <a:endParaRPr lang="nl-BE" dirty="0"/>
+          </a:p>
+          <a:p>
             <a:endParaRPr lang="nl-BE" dirty="0"/>
           </a:p>
           <a:p>
@@ -6427,6 +6441,67 @@
                       </p:childTnLst>
                     </p:cTn>
                   </p:par>
+                  <p:par>
+                    <p:cTn id="23" fill="hold">
+                      <p:stCondLst>
+                        <p:cond delay="indefinite"/>
+                      </p:stCondLst>
+                      <p:childTnLst>
+                        <p:par>
+                          <p:cTn id="24" fill="hold">
+                            <p:stCondLst>
+                              <p:cond delay="0"/>
+                            </p:stCondLst>
+                            <p:childTnLst>
+                              <p:par>
+                                <p:cTn id="25" presetID="10" presetClass="entr" presetSubtype="0" fill="hold" nodeType="clickEffect">
+                                  <p:stCondLst>
+                                    <p:cond delay="0"/>
+                                  </p:stCondLst>
+                                  <p:childTnLst>
+                                    <p:set>
+                                      <p:cBhvr>
+                                        <p:cTn id="26" dur="1" fill="hold">
+                                          <p:stCondLst>
+                                            <p:cond delay="0"/>
+                                          </p:stCondLst>
+                                        </p:cTn>
+                                        <p:tgtEl>
+                                          <p:spTgt spid="6">
+                                            <p:txEl>
+                                              <p:pRg st="7" end="7"/>
+                                            </p:txEl>
+                                          </p:spTgt>
+                                        </p:tgtEl>
+                                        <p:attrNameLst>
+                                          <p:attrName>style.visibility</p:attrName>
+                                        </p:attrNameLst>
+                                      </p:cBhvr>
+                                      <p:to>
+                                        <p:strVal val="visible"/>
+                                      </p:to>
+                                    </p:set>
+                                    <p:animEffect transition="in" filter="fade">
+                                      <p:cBhvr>
+                                        <p:cTn id="27" dur="500"/>
+                                        <p:tgtEl>
+                                          <p:spTgt spid="6">
+                                            <p:txEl>
+                                              <p:pRg st="7" end="7"/>
+                                            </p:txEl>
+                                          </p:spTgt>
+                                        </p:tgtEl>
+                                      </p:cBhvr>
+                                    </p:animEffect>
+                                  </p:childTnLst>
+                                </p:cTn>
+                              </p:par>
+                            </p:childTnLst>
+                          </p:cTn>
+                        </p:par>
+                      </p:childTnLst>
+                    </p:cTn>
+                  </p:par>
                 </p:childTnLst>
               </p:cTn>
               <p:prevCondLst>
@@ -6919,6 +6994,182 @@
       <p:bldP spid="9" grpId="0"/>
     </p:bldLst>
   </p:timing>
+</p:sld>
+</file>
+
+<file path=ppt/slides/slide4.xml><?xml version="1.0" encoding="utf-8"?>
+<p:sld xmlns:a="http://schemas.openxmlformats.org/drawingml/2006/main" xmlns:r="http://schemas.openxmlformats.org/officeDocument/2006/relationships" xmlns:p="http://schemas.openxmlformats.org/presentationml/2006/main">
+  <p:cSld>
+    <p:spTree>
+      <p:nvGrpSpPr>
+        <p:cNvPr id="1" name=""/>
+        <p:cNvGrpSpPr/>
+        <p:nvPr/>
+      </p:nvGrpSpPr>
+      <p:grpSpPr>
+        <a:xfrm>
+          <a:off x="0" y="0"/>
+          <a:ext cx="0" cy="0"/>
+          <a:chOff x="0" y="0"/>
+          <a:chExt cx="0" cy="0"/>
+        </a:xfrm>
+      </p:grpSpPr>
+      <p:sp>
+        <p:nvSpPr>
+          <p:cNvPr id="2" name="Titel 1">
+            <a:extLst>
+              <a:ext uri="{FF2B5EF4-FFF2-40B4-BE49-F238E27FC236}">
+                <a16:creationId xmlns:a16="http://schemas.microsoft.com/office/drawing/2014/main" id="{2FB8E248-D862-4306-9196-7654C8A2E3B5}"/>
+              </a:ext>
+            </a:extLst>
+          </p:cNvPr>
+          <p:cNvSpPr>
+            <a:spLocks noGrp="1"/>
+          </p:cNvSpPr>
+          <p:nvPr>
+            <p:ph type="title"/>
+          </p:nvPr>
+        </p:nvSpPr>
+        <p:spPr/>
+        <p:txBody>
+          <a:bodyPr/>
+          <a:lstStyle/>
+          <a:p>
+            <a:r>
+              <a:rPr lang="en-US" dirty="0"/>
+              <a:t>Solutions</a:t>
+            </a:r>
+          </a:p>
+        </p:txBody>
+      </p:sp>
+      <p:sp>
+        <p:nvSpPr>
+          <p:cNvPr id="3" name="Tijdelijke aanduiding voor tekst 2">
+            <a:extLst>
+              <a:ext uri="{FF2B5EF4-FFF2-40B4-BE49-F238E27FC236}">
+                <a16:creationId xmlns:a16="http://schemas.microsoft.com/office/drawing/2014/main" id="{90FDF5C7-12E4-41EA-824F-16149833D90E}"/>
+              </a:ext>
+            </a:extLst>
+          </p:cNvPr>
+          <p:cNvSpPr>
+            <a:spLocks noGrp="1"/>
+          </p:cNvSpPr>
+          <p:nvPr>
+            <p:ph type="body" idx="1"/>
+          </p:nvPr>
+        </p:nvSpPr>
+        <p:spPr/>
+        <p:txBody>
+          <a:bodyPr/>
+          <a:lstStyle/>
+          <a:p>
+            <a:endParaRPr lang="en-US" dirty="0"/>
+          </a:p>
+        </p:txBody>
+      </p:sp>
+      <p:sp>
+        <p:nvSpPr>
+          <p:cNvPr id="4" name="Tijdelijke aanduiding voor voettekst 3">
+            <a:extLst>
+              <a:ext uri="{FF2B5EF4-FFF2-40B4-BE49-F238E27FC236}">
+                <a16:creationId xmlns:a16="http://schemas.microsoft.com/office/drawing/2014/main" id="{7A4D3E5E-398B-4CBB-BA69-AFD9C0E8F78D}"/>
+              </a:ext>
+            </a:extLst>
+          </p:cNvPr>
+          <p:cNvSpPr>
+            <a:spLocks noGrp="1"/>
+          </p:cNvSpPr>
+          <p:nvPr>
+            <p:ph type="ftr" sz="quarter" idx="11"/>
+          </p:nvPr>
+        </p:nvSpPr>
+        <p:spPr/>
+        <p:txBody>
+          <a:bodyPr/>
+          <a:lstStyle/>
+          <a:p>
+            <a:r>
+              <a:rPr lang="nl-NL"/>
+              <a:t>Faculteit, departement, dienst …</a:t>
+            </a:r>
+          </a:p>
+        </p:txBody>
+      </p:sp>
+      <p:sp>
+        <p:nvSpPr>
+          <p:cNvPr id="5" name="Tijdelijke aanduiding voor dianummer 4">
+            <a:extLst>
+              <a:ext uri="{FF2B5EF4-FFF2-40B4-BE49-F238E27FC236}">
+                <a16:creationId xmlns:a16="http://schemas.microsoft.com/office/drawing/2014/main" id="{FC6A8605-7866-464D-B69E-56EF39493187}"/>
+              </a:ext>
+            </a:extLst>
+          </p:cNvPr>
+          <p:cNvSpPr>
+            <a:spLocks noGrp="1"/>
+          </p:cNvSpPr>
+          <p:nvPr>
+            <p:ph type="sldNum" sz="quarter" idx="12"/>
+          </p:nvPr>
+        </p:nvSpPr>
+        <p:spPr/>
+        <p:txBody>
+          <a:bodyPr/>
+          <a:lstStyle/>
+          <a:p>
+            <a:fld id="{0A297500-7527-634B-90F4-69D0994C32B4}" type="slidenum">
+              <a:rPr lang="nl-NL" smtClean="0"/>
+              <a:t>4</a:t>
+            </a:fld>
+            <a:endParaRPr lang="nl-NL"/>
+          </a:p>
+        </p:txBody>
+      </p:sp>
+      <p:sp>
+        <p:nvSpPr>
+          <p:cNvPr id="6" name="Tijdelijke aanduiding voor afbeelding 5">
+            <a:extLst>
+              <a:ext uri="{FF2B5EF4-FFF2-40B4-BE49-F238E27FC236}">
+                <a16:creationId xmlns:a16="http://schemas.microsoft.com/office/drawing/2014/main" id="{84C7C381-47B3-4BE7-AC81-DF28B6F3268D}"/>
+              </a:ext>
+            </a:extLst>
+          </p:cNvPr>
+          <p:cNvSpPr>
+            <a:spLocks noGrp="1"/>
+          </p:cNvSpPr>
+          <p:nvPr>
+            <p:ph type="pic" sz="quarter" idx="13"/>
+          </p:nvPr>
+        </p:nvSpPr>
+        <p:spPr/>
+      </p:sp>
+      <p:sp>
+        <p:nvSpPr>
+          <p:cNvPr id="7" name="Tijdelijke aanduiding voor afbeelding 6">
+            <a:extLst>
+              <a:ext uri="{FF2B5EF4-FFF2-40B4-BE49-F238E27FC236}">
+                <a16:creationId xmlns:a16="http://schemas.microsoft.com/office/drawing/2014/main" id="{FF60925A-ACA0-4B14-A3C3-F1037A526707}"/>
+              </a:ext>
+            </a:extLst>
+          </p:cNvPr>
+          <p:cNvSpPr>
+            <a:spLocks noGrp="1"/>
+          </p:cNvSpPr>
+          <p:nvPr>
+            <p:ph type="pic" sz="quarter" idx="14"/>
+          </p:nvPr>
+        </p:nvSpPr>
+        <p:spPr/>
+      </p:sp>
+    </p:spTree>
+    <p:extLst>
+      <p:ext uri="{BB962C8B-B14F-4D97-AF65-F5344CB8AC3E}">
+        <p14:creationId xmlns:p14="http://schemas.microsoft.com/office/powerpoint/2010/main" val="4203350872"/>
+      </p:ext>
+    </p:extLst>
+  </p:cSld>
+  <p:clrMapOvr>
+    <a:masterClrMapping/>
+  </p:clrMapOvr>
 </p:sld>
 </file>
 

</xml_diff>

<commit_message>
Finished part of testing + articles
I've finished the part about testing. (maybe i will do some additional work on it.). Now I will proceed by discussing metallic nanoparticles.
The used articles are also shared.
</commit_message>
<xml_diff>
--- a/NanoparticleToxicity.pptx
+++ b/NanoparticleToxicity.pptx
@@ -6,10 +6,10 @@
     <p:sldMasterId id="2147483694" r:id="rId2"/>
   </p:sldMasterIdLst>
   <p:notesMasterIdLst>
-    <p:notesMasterId r:id="rId21"/>
+    <p:notesMasterId r:id="rId22"/>
   </p:notesMasterIdLst>
   <p:handoutMasterIdLst>
-    <p:handoutMasterId r:id="rId22"/>
+    <p:handoutMasterId r:id="rId23"/>
   </p:handoutMasterIdLst>
   <p:sldIdLst>
     <p:sldId id="270" r:id="rId3"/>
@@ -22,14 +22,15 @@
     <p:sldId id="286" r:id="rId10"/>
     <p:sldId id="284" r:id="rId11"/>
     <p:sldId id="285" r:id="rId12"/>
-    <p:sldId id="276" r:id="rId13"/>
-    <p:sldId id="277" r:id="rId14"/>
-    <p:sldId id="278" r:id="rId15"/>
-    <p:sldId id="279" r:id="rId16"/>
-    <p:sldId id="280" r:id="rId17"/>
-    <p:sldId id="281" r:id="rId18"/>
-    <p:sldId id="282" r:id="rId19"/>
-    <p:sldId id="283" r:id="rId20"/>
+    <p:sldId id="287" r:id="rId13"/>
+    <p:sldId id="276" r:id="rId14"/>
+    <p:sldId id="277" r:id="rId15"/>
+    <p:sldId id="278" r:id="rId16"/>
+    <p:sldId id="279" r:id="rId17"/>
+    <p:sldId id="280" r:id="rId18"/>
+    <p:sldId id="281" r:id="rId19"/>
+    <p:sldId id="282" r:id="rId20"/>
+    <p:sldId id="283" r:id="rId21"/>
   </p:sldIdLst>
   <p:sldSz cx="12192000" cy="6858000"/>
   <p:notesSz cx="6858000" cy="9144000"/>
@@ -1343,7 +1344,7 @@
           <a:p>
             <a:fld id="{8954E32A-327F-AF4B-8E1F-209FBF93D26D}" type="slidenum">
               <a:rPr lang="nl-NL" smtClean="0"/>
-              <a:t>11</a:t>
+              <a:t>12</a:t>
             </a:fld>
             <a:endParaRPr lang="nl-NL"/>
           </a:p>
@@ -1427,7 +1428,7 @@
           <a:p>
             <a:fld id="{8954E32A-327F-AF4B-8E1F-209FBF93D26D}" type="slidenum">
               <a:rPr lang="nl-NL" smtClean="0"/>
-              <a:t>13</a:t>
+              <a:t>14</a:t>
             </a:fld>
             <a:endParaRPr lang="nl-NL"/>
           </a:p>
@@ -7439,10 +7440,10 @@
       </p:grpSpPr>
       <p:sp>
         <p:nvSpPr>
-          <p:cNvPr id="7" name="Tijdelijke aanduiding voor dianummer 23">
+          <p:cNvPr id="4" name="Titel 3">
             <a:extLst>
               <a:ext uri="{FF2B5EF4-FFF2-40B4-BE49-F238E27FC236}">
-                <a16:creationId xmlns:a16="http://schemas.microsoft.com/office/drawing/2014/main" id="{E7BA9955-551E-4B72-9196-84FDFE87439B}"/>
+                <a16:creationId xmlns:a16="http://schemas.microsoft.com/office/drawing/2014/main" id="{98572F6C-8685-4852-8B42-A84170433330}"/>
               </a:ext>
             </a:extLst>
           </p:cNvPr>
@@ -7450,330 +7451,451 @@
             <a:spLocks noGrp="1"/>
           </p:cNvSpPr>
           <p:nvPr>
-            <p:ph type="sldNum" sz="quarter" idx="12"/>
-          </p:nvPr>
-        </p:nvSpPr>
-        <p:spPr>
-          <a:xfrm>
-            <a:off x="11544000" y="-126730"/>
-            <a:ext cx="648000" cy="648000"/>
-          </a:xfrm>
-        </p:spPr>
+            <p:ph type="title"/>
+          </p:nvPr>
+        </p:nvSpPr>
+        <p:spPr/>
         <p:txBody>
           <a:bodyPr/>
           <a:lstStyle/>
           <a:p>
-            <a:fld id="{CF179DAE-D0A6-40C3-B8BC-6A97C268D03A}" type="slidenum">
-              <a:rPr lang="nl-NL" sz="1200" smtClean="0">
-                <a:solidFill>
-                  <a:srgbClr val="1D8DB0"/>
-                </a:solidFill>
-              </a:rPr>
-              <a:pPr/>
-              <a:t>11</a:t>
-            </a:fld>
-            <a:r>
-              <a:rPr lang="nl-NL" sz="1200" dirty="0">
-                <a:solidFill>
-                  <a:srgbClr val="1D8DB0"/>
-                </a:solidFill>
-              </a:rPr>
-              <a:t>/31</a:t>
-            </a:r>
-          </a:p>
-        </p:txBody>
-      </p:sp>
-      <p:sp>
-        <p:nvSpPr>
-          <p:cNvPr id="9" name="Titel 4">
+            <a:r>
+              <a:rPr lang="en-US" dirty="0"/>
+              <a:t>Areas studied for nanotoxicity </a:t>
+            </a:r>
+          </a:p>
+        </p:txBody>
+      </p:sp>
+      <p:sp>
+        <p:nvSpPr>
+          <p:cNvPr id="6" name="Rechthoek: afgeronde hoeken 5">
             <a:extLst>
               <a:ext uri="{FF2B5EF4-FFF2-40B4-BE49-F238E27FC236}">
-                <a16:creationId xmlns:a16="http://schemas.microsoft.com/office/drawing/2014/main" id="{32C054A8-9043-41C9-BA29-6C11E3B87A6D}"/>
+                <a16:creationId xmlns:a16="http://schemas.microsoft.com/office/drawing/2014/main" id="{93482A94-744F-4064-B13B-46ED4396501E}"/>
               </a:ext>
             </a:extLst>
           </p:cNvPr>
-          <p:cNvSpPr>
-            <a:spLocks noGrp="1"/>
-          </p:cNvSpPr>
-          <p:nvPr>
-            <p:ph type="title"/>
-          </p:nvPr>
+          <p:cNvSpPr/>
+          <p:nvPr/>
         </p:nvSpPr>
         <p:spPr>
           <a:xfrm>
-            <a:off x="576263" y="336550"/>
-            <a:ext cx="11041062" cy="1152525"/>
+            <a:off x="1219200" y="1429407"/>
+            <a:ext cx="9753600" cy="4151586"/>
           </a:xfrm>
-        </p:spPr>
-        <p:txBody>
-          <a:bodyPr/>
-          <a:lstStyle/>
-          <a:p>
-            <a:r>
-              <a:rPr lang="nl-BE" dirty="0" err="1"/>
-              <a:t>Genotoxicity</a:t>
-            </a:r>
-            <a:endParaRPr lang="nl-BE" dirty="0"/>
-          </a:p>
-        </p:txBody>
-      </p:sp>
-      <p:sp>
-        <p:nvSpPr>
-          <p:cNvPr id="8" name="Tijdelijke aanduiding voor inhoud 1">
-            <a:extLst>
-              <a:ext uri="{FF2B5EF4-FFF2-40B4-BE49-F238E27FC236}">
-                <a16:creationId xmlns:a16="http://schemas.microsoft.com/office/drawing/2014/main" id="{FD48FE27-13D3-407C-9CF5-D7CAC1400D54}"/>
-              </a:ext>
-            </a:extLst>
-          </p:cNvPr>
-          <p:cNvSpPr>
-            <a:spLocks noGrp="1"/>
-          </p:cNvSpPr>
-          <p:nvPr>
-            <p:ph idx="1"/>
-          </p:nvPr>
-        </p:nvSpPr>
-        <p:spPr>
-          <a:xfrm>
-            <a:off x="576000" y="1656000"/>
-            <a:ext cx="11041200" cy="4043464"/>
-          </a:xfrm>
-        </p:spPr>
-        <p:txBody>
-          <a:bodyPr>
-            <a:normAutofit/>
-          </a:bodyPr>
-          <a:lstStyle/>
-          <a:p>
-            <a:pPr marL="0" indent="0">
-              <a:buNone/>
-            </a:pPr>
-            <a:r>
-              <a:rPr lang="nl-BE" sz="2000" dirty="0" err="1"/>
-              <a:t>Describes</a:t>
-            </a:r>
-            <a:r>
-              <a:rPr lang="nl-BE" sz="2000" dirty="0"/>
-              <a:t> </a:t>
-            </a:r>
-            <a:r>
-              <a:rPr lang="nl-BE" sz="2000" dirty="0" err="1"/>
-              <a:t>the</a:t>
-            </a:r>
-            <a:r>
-              <a:rPr lang="nl-BE" sz="2000" dirty="0"/>
-              <a:t> </a:t>
-            </a:r>
-            <a:r>
-              <a:rPr lang="nl-BE" sz="2000" dirty="0" err="1"/>
-              <a:t>ability</a:t>
-            </a:r>
-            <a:r>
-              <a:rPr lang="nl-BE" sz="2000" dirty="0"/>
-              <a:t> of a </a:t>
-            </a:r>
-            <a:r>
-              <a:rPr lang="nl-BE" sz="2000" dirty="0" err="1"/>
-              <a:t>chemical</a:t>
-            </a:r>
-            <a:r>
-              <a:rPr lang="nl-BE" sz="2000" dirty="0"/>
-              <a:t> test agent </a:t>
-            </a:r>
-            <a:r>
-              <a:rPr lang="nl-BE" sz="2000" dirty="0" err="1"/>
-              <a:t>to</a:t>
-            </a:r>
-            <a:r>
-              <a:rPr lang="nl-BE" sz="2000" dirty="0"/>
-              <a:t> </a:t>
-            </a:r>
-            <a:r>
-              <a:rPr lang="nl-BE" sz="2000" dirty="0" err="1"/>
-              <a:t>induce</a:t>
-            </a:r>
-            <a:r>
-              <a:rPr lang="nl-BE" sz="2000" dirty="0"/>
-              <a:t> DNA </a:t>
-            </a:r>
-            <a:r>
-              <a:rPr lang="nl-BE" sz="2000" dirty="0" err="1"/>
-              <a:t>damage</a:t>
-            </a:r>
-            <a:endParaRPr lang="nl-BE" sz="2000" dirty="0"/>
-          </a:p>
-        </p:txBody>
-      </p:sp>
-      <p:sp>
-        <p:nvSpPr>
-          <p:cNvPr id="10" name="Tekstvak 9">
-            <a:extLst>
-              <a:ext uri="{FF2B5EF4-FFF2-40B4-BE49-F238E27FC236}">
-                <a16:creationId xmlns:a16="http://schemas.microsoft.com/office/drawing/2014/main" id="{F9AF6A87-507F-4E2E-8A2A-840080D13776}"/>
-              </a:ext>
-            </a:extLst>
-          </p:cNvPr>
-          <p:cNvSpPr txBox="1"/>
-          <p:nvPr/>
-        </p:nvSpPr>
-        <p:spPr>
-          <a:xfrm>
-            <a:off x="159798" y="58771"/>
-            <a:ext cx="5832629" cy="276999"/>
-          </a:xfrm>
-          <a:prstGeom prst="rect">
+          <a:prstGeom prst="roundRect">
             <a:avLst/>
           </a:prstGeom>
-          <a:noFill/>
+          <a:solidFill>
+            <a:schemeClr val="bg2"/>
+          </a:solidFill>
+          <a:ln w="28575"/>
         </p:spPr>
-        <p:txBody>
-          <a:bodyPr wrap="square" rtlCol="0">
-            <a:spAutoFit/>
-          </a:bodyPr>
-          <a:lstStyle/>
-          <a:p>
-            <a:r>
-              <a:rPr lang="nl-BE" sz="1200" dirty="0">
-                <a:solidFill>
-                  <a:srgbClr val="1D8DB0"/>
-                </a:solidFill>
-              </a:rPr>
-              <a:t>J. </a:t>
-            </a:r>
-            <a:r>
-              <a:rPr lang="nl-BE" sz="1200" dirty="0" err="1">
-                <a:solidFill>
-                  <a:srgbClr val="1D8DB0"/>
-                </a:solidFill>
-              </a:rPr>
-              <a:t>Neirynck</a:t>
-            </a:r>
-            <a:r>
-              <a:rPr lang="nl-BE" sz="1200" dirty="0">
-                <a:solidFill>
-                  <a:srgbClr val="1D8DB0"/>
-                </a:solidFill>
-              </a:rPr>
-              <a:t>, F. Van </a:t>
-            </a:r>
-            <a:r>
-              <a:rPr lang="nl-BE" sz="1200" dirty="0" err="1">
-                <a:solidFill>
-                  <a:srgbClr val="1D8DB0"/>
-                </a:solidFill>
-              </a:rPr>
-              <a:t>Eecke</a:t>
-            </a:r>
-            <a:r>
-              <a:rPr lang="nl-BE" sz="1200" dirty="0">
-                <a:solidFill>
-                  <a:srgbClr val="1D8DB0"/>
-                </a:solidFill>
-              </a:rPr>
-              <a:t> &amp; R. Vrielynck</a:t>
-            </a:r>
-          </a:p>
-        </p:txBody>
-      </p:sp>
-      <p:sp>
-        <p:nvSpPr>
-          <p:cNvPr id="11" name="Tekstvak 10">
-            <a:extLst>
-              <a:ext uri="{FF2B5EF4-FFF2-40B4-BE49-F238E27FC236}">
-                <a16:creationId xmlns:a16="http://schemas.microsoft.com/office/drawing/2014/main" id="{02C83A39-3DA1-4516-B834-3C3D5F8552F0}"/>
-              </a:ext>
-            </a:extLst>
-          </p:cNvPr>
-          <p:cNvSpPr txBox="1"/>
-          <p:nvPr/>
-        </p:nvSpPr>
-        <p:spPr>
-          <a:xfrm>
-            <a:off x="576000" y="6356412"/>
-            <a:ext cx="10351364" cy="315471"/>
-          </a:xfrm>
-          <a:prstGeom prst="rect">
-            <a:avLst/>
-          </a:prstGeom>
-          <a:noFill/>
-        </p:spPr>
-        <p:txBody>
-          <a:bodyPr wrap="square" rtlCol="0">
-            <a:spAutoFit/>
-          </a:bodyPr>
-          <a:lstStyle/>
-          <a:p>
-            <a:r>
-              <a:rPr lang="nl-BE" sz="1450" dirty="0" err="1">
-                <a:solidFill>
-                  <a:schemeClr val="bg1"/>
-                </a:solidFill>
-              </a:rPr>
-              <a:t>Introduction</a:t>
-            </a:r>
-            <a:r>
-              <a:rPr lang="nl-BE" sz="1450" dirty="0">
-                <a:solidFill>
-                  <a:schemeClr val="bg1"/>
-                </a:solidFill>
-              </a:rPr>
-              <a:t>	</a:t>
-            </a:r>
-            <a:r>
-              <a:rPr lang="nl-BE" sz="1450" b="1" dirty="0">
-                <a:solidFill>
-                  <a:schemeClr val="bg1"/>
-                </a:solidFill>
-              </a:rPr>
-              <a:t>	Framework</a:t>
-            </a:r>
-            <a:r>
-              <a:rPr lang="nl-BE" sz="1450" dirty="0">
-                <a:solidFill>
-                  <a:schemeClr val="bg1"/>
-                </a:solidFill>
-              </a:rPr>
-              <a:t>		</a:t>
-            </a:r>
-            <a:r>
-              <a:rPr lang="nl-BE" sz="1450" dirty="0" err="1">
-                <a:solidFill>
-                  <a:schemeClr val="bg1"/>
-                </a:solidFill>
-              </a:rPr>
-              <a:t>Techniques</a:t>
-            </a:r>
-            <a:r>
-              <a:rPr lang="nl-BE" sz="1450" dirty="0">
-                <a:solidFill>
-                  <a:schemeClr val="bg1"/>
-                </a:solidFill>
-              </a:rPr>
-              <a:t> &amp; </a:t>
-            </a:r>
-            <a:r>
-              <a:rPr lang="nl-BE" sz="1450" dirty="0" err="1">
-                <a:solidFill>
-                  <a:schemeClr val="bg1"/>
-                </a:solidFill>
-              </a:rPr>
-              <a:t>Results</a:t>
-            </a:r>
-            <a:r>
-              <a:rPr lang="nl-BE" sz="1450" dirty="0">
-                <a:solidFill>
-                  <a:schemeClr val="bg1"/>
-                </a:solidFill>
-              </a:rPr>
-              <a:t>			Summary</a:t>
-            </a:r>
+        <p:style>
+          <a:lnRef idx="2">
+            <a:schemeClr val="accent1">
+              <a:shade val="50000"/>
+            </a:schemeClr>
+          </a:lnRef>
+          <a:fillRef idx="1">
+            <a:schemeClr val="accent1"/>
+          </a:fillRef>
+          <a:effectRef idx="0">
+            <a:schemeClr val="accent1"/>
+          </a:effectRef>
+          <a:fontRef idx="minor">
+            <a:schemeClr val="lt1"/>
+          </a:fontRef>
+        </p:style>
+        <p:txBody>
+          <a:bodyPr rtlCol="0" anchor="ctr"/>
+          <a:lstStyle/>
+          <a:p>
+            <a:r>
+              <a:rPr lang="nl-BE" sz="2000" b="1" dirty="0">
+                <a:solidFill>
+                  <a:srgbClr val="2F4D5D"/>
+                </a:solidFill>
+              </a:rPr>
+              <a:t>Area 3: In Vivo</a:t>
+            </a:r>
+          </a:p>
+          <a:p>
+            <a:r>
+              <a:rPr lang="nl-BE" sz="2000" b="1" dirty="0">
+                <a:solidFill>
+                  <a:srgbClr val="2F4D5D"/>
+                </a:solidFill>
+              </a:rPr>
+              <a:t>= </a:t>
+            </a:r>
+            <a:r>
+              <a:rPr lang="nl-BE" sz="2000" dirty="0">
+                <a:solidFill>
+                  <a:srgbClr val="2F4D5D"/>
+                </a:solidFill>
+              </a:rPr>
+              <a:t>Test </a:t>
+            </a:r>
+            <a:r>
+              <a:rPr lang="nl-BE" sz="2000" dirty="0" err="1">
+                <a:solidFill>
+                  <a:srgbClr val="2F4D5D"/>
+                </a:solidFill>
+              </a:rPr>
+              <a:t>results</a:t>
+            </a:r>
+            <a:r>
+              <a:rPr lang="nl-BE" sz="2000" dirty="0">
+                <a:solidFill>
+                  <a:srgbClr val="2F4D5D"/>
+                </a:solidFill>
+              </a:rPr>
+              <a:t> </a:t>
+            </a:r>
+            <a:r>
+              <a:rPr lang="nl-BE" sz="2000" dirty="0" err="1">
+                <a:solidFill>
+                  <a:srgbClr val="2F4D5D"/>
+                </a:solidFill>
+              </a:rPr>
+              <a:t>from</a:t>
+            </a:r>
+            <a:r>
+              <a:rPr lang="nl-BE" sz="2000" dirty="0">
+                <a:solidFill>
+                  <a:srgbClr val="2F4D5D"/>
+                </a:solidFill>
+              </a:rPr>
+              <a:t> In Vitro </a:t>
+            </a:r>
+            <a:r>
+              <a:rPr lang="nl-BE" sz="2000" dirty="0" err="1">
+                <a:solidFill>
+                  <a:srgbClr val="2F4D5D"/>
+                </a:solidFill>
+              </a:rPr>
+              <a:t>experiments</a:t>
+            </a:r>
+            <a:endParaRPr lang="nl-BE" sz="2000" dirty="0">
+              <a:solidFill>
+                <a:srgbClr val="2F4D5D"/>
+              </a:solidFill>
+            </a:endParaRPr>
+          </a:p>
+          <a:p>
+            <a:pPr marL="342900" indent="-342900">
+              <a:buFont typeface="Wingdings" panose="05000000000000000000" pitchFamily="2" charset="2"/>
+              <a:buChar char="Ø"/>
+            </a:pPr>
+            <a:endParaRPr lang="nl-BE" sz="2000" dirty="0">
+              <a:solidFill>
+                <a:srgbClr val="2F4D5D"/>
+              </a:solidFill>
+            </a:endParaRPr>
+          </a:p>
+          <a:p>
+            <a:r>
+              <a:rPr lang="nl-BE" sz="2000" dirty="0">
+                <a:solidFill>
+                  <a:srgbClr val="2F4D5D"/>
+                </a:solidFill>
+              </a:rPr>
+              <a:t>Test </a:t>
+            </a:r>
+            <a:r>
+              <a:rPr lang="nl-BE" sz="2000" dirty="0" err="1">
+                <a:solidFill>
+                  <a:srgbClr val="2F4D5D"/>
+                </a:solidFill>
+              </a:rPr>
+              <a:t>for</a:t>
+            </a:r>
+            <a:r>
+              <a:rPr lang="nl-BE" sz="2000" dirty="0">
+                <a:solidFill>
+                  <a:srgbClr val="2F4D5D"/>
+                </a:solidFill>
+              </a:rPr>
+              <a:t> </a:t>
+            </a:r>
+            <a:r>
+              <a:rPr lang="nl-BE" sz="2000" dirty="0" err="1">
+                <a:solidFill>
+                  <a:srgbClr val="2F4D5D"/>
+                </a:solidFill>
+              </a:rPr>
+              <a:t>effects</a:t>
+            </a:r>
+            <a:r>
+              <a:rPr lang="nl-BE" sz="2000" dirty="0">
+                <a:solidFill>
+                  <a:srgbClr val="2F4D5D"/>
+                </a:solidFill>
+              </a:rPr>
+              <a:t> on: </a:t>
+            </a:r>
+          </a:p>
+          <a:p>
+            <a:pPr marL="800100" lvl="1" indent="-342900">
+              <a:buFont typeface="Wingdings" panose="05000000000000000000" pitchFamily="2" charset="2"/>
+              <a:buChar char="Ø"/>
+            </a:pPr>
+            <a:r>
+              <a:rPr lang="nl-BE" sz="2000" dirty="0">
+                <a:solidFill>
+                  <a:srgbClr val="2F4D5D"/>
+                </a:solidFill>
+              </a:rPr>
+              <a:t> immune system response </a:t>
+            </a:r>
+          </a:p>
+          <a:p>
+            <a:pPr marL="800100" lvl="1" indent="-342900">
+              <a:buFont typeface="Wingdings" panose="05000000000000000000" pitchFamily="2" charset="2"/>
+              <a:buChar char="Ø"/>
+            </a:pPr>
+            <a:r>
+              <a:rPr lang="nl-BE" sz="2000" dirty="0" err="1">
+                <a:solidFill>
+                  <a:srgbClr val="2F4D5D"/>
+                </a:solidFill>
+              </a:rPr>
+              <a:t>Translocation</a:t>
+            </a:r>
+            <a:r>
+              <a:rPr lang="nl-BE" sz="2000" dirty="0">
+                <a:solidFill>
+                  <a:srgbClr val="2F4D5D"/>
+                </a:solidFill>
+              </a:rPr>
+              <a:t> </a:t>
+            </a:r>
+            <a:r>
+              <a:rPr lang="nl-BE" sz="2000" dirty="0" err="1">
+                <a:solidFill>
+                  <a:srgbClr val="2F4D5D"/>
+                </a:solidFill>
+              </a:rPr>
+              <a:t>to</a:t>
+            </a:r>
+            <a:r>
+              <a:rPr lang="nl-BE" sz="2000" dirty="0">
+                <a:solidFill>
+                  <a:srgbClr val="2F4D5D"/>
+                </a:solidFill>
+              </a:rPr>
+              <a:t> </a:t>
+            </a:r>
+            <a:r>
+              <a:rPr lang="nl-BE" sz="2000" dirty="0" err="1">
+                <a:solidFill>
+                  <a:srgbClr val="2F4D5D"/>
+                </a:solidFill>
+              </a:rPr>
+              <a:t>other</a:t>
+            </a:r>
+            <a:r>
+              <a:rPr lang="nl-BE" sz="2000" dirty="0">
+                <a:solidFill>
+                  <a:srgbClr val="2F4D5D"/>
+                </a:solidFill>
+              </a:rPr>
+              <a:t> </a:t>
+            </a:r>
+            <a:r>
+              <a:rPr lang="nl-BE" sz="2000" dirty="0" err="1">
+                <a:solidFill>
+                  <a:srgbClr val="2F4D5D"/>
+                </a:solidFill>
+              </a:rPr>
+              <a:t>areas</a:t>
+            </a:r>
+            <a:r>
+              <a:rPr lang="nl-BE" sz="2000" dirty="0">
+                <a:solidFill>
+                  <a:srgbClr val="2F4D5D"/>
+                </a:solidFill>
+              </a:rPr>
+              <a:t> </a:t>
+            </a:r>
+            <a:r>
+              <a:rPr lang="nl-BE" sz="2000" dirty="0" err="1">
+                <a:solidFill>
+                  <a:srgbClr val="2F4D5D"/>
+                </a:solidFill>
+              </a:rPr>
+              <a:t>after</a:t>
+            </a:r>
+            <a:r>
+              <a:rPr lang="nl-BE" sz="2000" dirty="0">
+                <a:solidFill>
+                  <a:srgbClr val="2F4D5D"/>
+                </a:solidFill>
+              </a:rPr>
+              <a:t> </a:t>
+            </a:r>
+            <a:r>
+              <a:rPr lang="nl-BE" sz="2000" dirty="0" err="1">
+                <a:solidFill>
+                  <a:srgbClr val="2F4D5D"/>
+                </a:solidFill>
+              </a:rPr>
+              <a:t>uptake</a:t>
+            </a:r>
+            <a:endParaRPr lang="nl-BE" sz="2000" dirty="0">
+              <a:solidFill>
+                <a:srgbClr val="2F4D5D"/>
+              </a:solidFill>
+            </a:endParaRPr>
+          </a:p>
+          <a:p>
+            <a:pPr algn="ctr"/>
+            <a:endParaRPr lang="nl-BE" sz="2000" dirty="0">
+              <a:solidFill>
+                <a:srgbClr val="2F4D5D"/>
+              </a:solidFill>
+            </a:endParaRPr>
+          </a:p>
+          <a:p>
+            <a:r>
+              <a:rPr lang="nl-BE" sz="2000" b="1" dirty="0">
+                <a:solidFill>
+                  <a:srgbClr val="2F4D5D"/>
+                </a:solidFill>
+              </a:rPr>
+              <a:t>Area 4: </a:t>
+            </a:r>
+            <a:r>
+              <a:rPr lang="nl-BE" sz="2000" b="1" dirty="0" err="1">
+                <a:solidFill>
+                  <a:srgbClr val="2F4D5D"/>
+                </a:solidFill>
+              </a:rPr>
+              <a:t>Toxicokinetic</a:t>
+            </a:r>
+            <a:r>
+              <a:rPr lang="nl-BE" sz="2000" b="1" dirty="0">
+                <a:solidFill>
+                  <a:srgbClr val="2F4D5D"/>
+                </a:solidFill>
+              </a:rPr>
+              <a:t> </a:t>
+            </a:r>
+            <a:r>
+              <a:rPr lang="nl-BE" sz="2000" b="1" dirty="0" err="1">
+                <a:solidFill>
+                  <a:srgbClr val="2F4D5D"/>
+                </a:solidFill>
+              </a:rPr>
+              <a:t>modeling</a:t>
+            </a:r>
+            <a:endParaRPr lang="nl-BE" sz="2000" b="1" dirty="0">
+              <a:solidFill>
+                <a:srgbClr val="2F4D5D"/>
+              </a:solidFill>
+            </a:endParaRPr>
+          </a:p>
+          <a:p>
+            <a:endParaRPr lang="nl-BE" sz="2000" b="1" dirty="0">
+              <a:solidFill>
+                <a:srgbClr val="2F4D5D"/>
+              </a:solidFill>
+            </a:endParaRPr>
+          </a:p>
+          <a:p>
+            <a:r>
+              <a:rPr lang="en-US" sz="2000" dirty="0">
+                <a:solidFill>
+                  <a:srgbClr val="2F4D5D"/>
+                </a:solidFill>
+              </a:rPr>
+              <a:t>describes the </a:t>
+            </a:r>
+            <a:r>
+              <a:rPr lang="en-US" sz="2000" b="1" dirty="0">
+                <a:solidFill>
+                  <a:srgbClr val="2F4D5D"/>
+                </a:solidFill>
+              </a:rPr>
+              <a:t>absorption</a:t>
+            </a:r>
+            <a:r>
+              <a:rPr lang="en-US" sz="2000" dirty="0">
+                <a:solidFill>
+                  <a:srgbClr val="2F4D5D"/>
+                </a:solidFill>
+              </a:rPr>
+              <a:t>, </a:t>
+            </a:r>
+            <a:r>
+              <a:rPr lang="en-US" sz="2000" b="1" dirty="0">
+                <a:solidFill>
+                  <a:srgbClr val="2F4D5D"/>
+                </a:solidFill>
+              </a:rPr>
+              <a:t>distribution</a:t>
+            </a:r>
+            <a:r>
+              <a:rPr lang="en-US" sz="2000" dirty="0">
+                <a:solidFill>
+                  <a:srgbClr val="2F4D5D"/>
+                </a:solidFill>
+              </a:rPr>
+              <a:t>, </a:t>
+            </a:r>
+            <a:r>
+              <a:rPr lang="en-US" sz="2000" b="1" dirty="0">
+                <a:solidFill>
+                  <a:srgbClr val="2F4D5D"/>
+                </a:solidFill>
+              </a:rPr>
+              <a:t>metabolism</a:t>
+            </a:r>
+            <a:r>
+              <a:rPr lang="en-US" sz="2000" dirty="0">
+                <a:solidFill>
+                  <a:srgbClr val="2F4D5D"/>
+                </a:solidFill>
+              </a:rPr>
+              <a:t> and </a:t>
+            </a:r>
+            <a:r>
+              <a:rPr lang="en-US" sz="2000" b="1" dirty="0">
+                <a:solidFill>
+                  <a:srgbClr val="2F4D5D"/>
+                </a:solidFill>
+              </a:rPr>
+              <a:t>elimination</a:t>
+            </a:r>
+            <a:r>
+              <a:rPr lang="en-US" sz="2000" dirty="0">
+                <a:solidFill>
+                  <a:srgbClr val="2F4D5D"/>
+                </a:solidFill>
+              </a:rPr>
+              <a:t> of xenobiotics (foreign materials) within an organism, as a function of dose and time. </a:t>
+            </a:r>
+            <a:endParaRPr lang="nl-BE" sz="2000" dirty="0">
+              <a:solidFill>
+                <a:srgbClr val="2F4D5D"/>
+              </a:solidFill>
+            </a:endParaRPr>
+          </a:p>
+          <a:p>
+            <a:pPr algn="ctr"/>
+            <a:endParaRPr lang="nl-BE" sz="2000" dirty="0">
+              <a:solidFill>
+                <a:srgbClr val="2F4D5D"/>
+              </a:solidFill>
+            </a:endParaRPr>
           </a:p>
         </p:txBody>
       </p:sp>
     </p:spTree>
     <p:extLst>
       <p:ext uri="{BB962C8B-B14F-4D97-AF65-F5344CB8AC3E}">
-        <p14:creationId xmlns:p14="http://schemas.microsoft.com/office/powerpoint/2010/main" val="2708186672"/>
+        <p14:creationId xmlns:p14="http://schemas.microsoft.com/office/powerpoint/2010/main" val="2813897498"/>
       </p:ext>
     </p:extLst>
   </p:cSld>
@@ -7802,10 +7924,10 @@
       </p:grpSpPr>
       <p:sp>
         <p:nvSpPr>
-          <p:cNvPr id="2" name="Titel 1">
+          <p:cNvPr id="7" name="Tijdelijke aanduiding voor dianummer 23">
             <a:extLst>
               <a:ext uri="{FF2B5EF4-FFF2-40B4-BE49-F238E27FC236}">
-                <a16:creationId xmlns:a16="http://schemas.microsoft.com/office/drawing/2014/main" id="{069A9DF7-0F9D-4549-B4E3-66F98F66FF7B}"/>
+                <a16:creationId xmlns:a16="http://schemas.microsoft.com/office/drawing/2014/main" id="{E7BA9955-551E-4B72-9196-84FDFE87439B}"/>
               </a:ext>
             </a:extLst>
           </p:cNvPr>
@@ -7813,52 +7935,45 @@
             <a:spLocks noGrp="1"/>
           </p:cNvSpPr>
           <p:nvPr>
-            <p:ph type="title"/>
-          </p:nvPr>
-        </p:nvSpPr>
-        <p:spPr/>
+            <p:ph type="sldNum" sz="quarter" idx="12"/>
+          </p:nvPr>
+        </p:nvSpPr>
+        <p:spPr>
+          <a:xfrm>
+            <a:off x="11544000" y="-126730"/>
+            <a:ext cx="648000" cy="648000"/>
+          </a:xfrm>
+        </p:spPr>
         <p:txBody>
           <a:bodyPr/>
           <a:lstStyle/>
           <a:p>
-            <a:r>
-              <a:rPr lang="nl-NL" dirty="0">
-                <a:latin typeface="Arial"/>
-                <a:cs typeface="Arial"/>
-              </a:rPr>
-              <a:t>Parameters </a:t>
-            </a:r>
-            <a:r>
-              <a:rPr lang="nl-NL" dirty="0" err="1">
-                <a:latin typeface="Arial"/>
-                <a:cs typeface="Arial"/>
-              </a:rPr>
-              <a:t>influcencing</a:t>
-            </a:r>
-            <a:r>
-              <a:rPr lang="nl-NL" dirty="0">
-                <a:latin typeface="Arial"/>
-                <a:cs typeface="Arial"/>
-              </a:rPr>
-              <a:t> </a:t>
-            </a:r>
-            <a:r>
-              <a:rPr lang="nl-NL" dirty="0" err="1">
-                <a:latin typeface="Arial"/>
-                <a:cs typeface="Arial"/>
-              </a:rPr>
-              <a:t>toxicity</a:t>
-            </a:r>
-            <a:endParaRPr lang="nl-NL" dirty="0" err="1"/>
-          </a:p>
-        </p:txBody>
-      </p:sp>
-      <p:sp>
-        <p:nvSpPr>
-          <p:cNvPr id="3" name="Tijdelijke aanduiding voor tekst 2">
+            <a:fld id="{CF179DAE-D0A6-40C3-B8BC-6A97C268D03A}" type="slidenum">
+              <a:rPr lang="nl-NL" sz="1200" smtClean="0">
+                <a:solidFill>
+                  <a:srgbClr val="1D8DB0"/>
+                </a:solidFill>
+              </a:rPr>
+              <a:pPr/>
+              <a:t>12</a:t>
+            </a:fld>
+            <a:r>
+              <a:rPr lang="nl-NL" sz="1200" dirty="0">
+                <a:solidFill>
+                  <a:srgbClr val="1D8DB0"/>
+                </a:solidFill>
+              </a:rPr>
+              <a:t>/31</a:t>
+            </a:r>
+          </a:p>
+        </p:txBody>
+      </p:sp>
+      <p:sp>
+        <p:nvSpPr>
+          <p:cNvPr id="9" name="Titel 4">
             <a:extLst>
               <a:ext uri="{FF2B5EF4-FFF2-40B4-BE49-F238E27FC236}">
-                <a16:creationId xmlns:a16="http://schemas.microsoft.com/office/drawing/2014/main" id="{0765C0FE-D1DD-43F6-A1E8-FF2D7256F7B0}"/>
+                <a16:creationId xmlns:a16="http://schemas.microsoft.com/office/drawing/2014/main" id="{32C054A8-9043-41C9-BA29-6C11E3B87A6D}"/>
               </a:ext>
             </a:extLst>
           </p:cNvPr>
@@ -7866,24 +7981,33 @@
             <a:spLocks noGrp="1"/>
           </p:cNvSpPr>
           <p:nvPr>
-            <p:ph type="body" idx="1"/>
-          </p:nvPr>
-        </p:nvSpPr>
-        <p:spPr/>
+            <p:ph type="title"/>
+          </p:nvPr>
+        </p:nvSpPr>
+        <p:spPr>
+          <a:xfrm>
+            <a:off x="576263" y="336550"/>
+            <a:ext cx="11041062" cy="1152525"/>
+          </a:xfrm>
+        </p:spPr>
         <p:txBody>
           <a:bodyPr/>
           <a:lstStyle/>
           <a:p>
-            <a:endParaRPr lang="nl-NL"/>
-          </a:p>
-        </p:txBody>
-      </p:sp>
-      <p:sp>
-        <p:nvSpPr>
-          <p:cNvPr id="4" name="Tijdelijke aanduiding voor voettekst 3">
+            <a:r>
+              <a:rPr lang="nl-BE" dirty="0" err="1"/>
+              <a:t>Genotoxicity</a:t>
+            </a:r>
+            <a:endParaRPr lang="nl-BE" dirty="0"/>
+          </a:p>
+        </p:txBody>
+      </p:sp>
+      <p:sp>
+        <p:nvSpPr>
+          <p:cNvPr id="8" name="Tijdelijke aanduiding voor inhoud 1">
             <a:extLst>
               <a:ext uri="{FF2B5EF4-FFF2-40B4-BE49-F238E27FC236}">
-                <a16:creationId xmlns:a16="http://schemas.microsoft.com/office/drawing/2014/main" id="{E63340FA-5B57-4924-A4D1-10B8E5D14A4C}"/>
+                <a16:creationId xmlns:a16="http://schemas.microsoft.com/office/drawing/2014/main" id="{FD48FE27-13D3-407C-9CF5-D7CAC1400D54}"/>
               </a:ext>
             </a:extLst>
           </p:cNvPr>
@@ -7891,90 +8015,250 @@
             <a:spLocks noGrp="1"/>
           </p:cNvSpPr>
           <p:nvPr>
-            <p:ph type="ftr" sz="quarter" idx="11"/>
-          </p:nvPr>
-        </p:nvSpPr>
-        <p:spPr/>
-        <p:txBody>
-          <a:bodyPr/>
-          <a:lstStyle/>
-          <a:p>
-            <a:r>
-              <a:rPr lang="nl-NL"/>
-              <a:t>Faculteit, departement, dienst …</a:t>
-            </a:r>
-          </a:p>
-        </p:txBody>
-      </p:sp>
-      <p:sp>
-        <p:nvSpPr>
-          <p:cNvPr id="5" name="Tijdelijke aanduiding voor dianummer 4">
+            <p:ph idx="1"/>
+          </p:nvPr>
+        </p:nvSpPr>
+        <p:spPr>
+          <a:xfrm>
+            <a:off x="576000" y="1656000"/>
+            <a:ext cx="11041200" cy="4043464"/>
+          </a:xfrm>
+        </p:spPr>
+        <p:txBody>
+          <a:bodyPr>
+            <a:normAutofit/>
+          </a:bodyPr>
+          <a:lstStyle/>
+          <a:p>
+            <a:pPr marL="0" indent="0">
+              <a:buNone/>
+            </a:pPr>
+            <a:r>
+              <a:rPr lang="nl-BE" sz="2000" dirty="0" err="1"/>
+              <a:t>Describes</a:t>
+            </a:r>
+            <a:r>
+              <a:rPr lang="nl-BE" sz="2000" dirty="0"/>
+              <a:t> </a:t>
+            </a:r>
+            <a:r>
+              <a:rPr lang="nl-BE" sz="2000" dirty="0" err="1"/>
+              <a:t>the</a:t>
+            </a:r>
+            <a:r>
+              <a:rPr lang="nl-BE" sz="2000" dirty="0"/>
+              <a:t> </a:t>
+            </a:r>
+            <a:r>
+              <a:rPr lang="nl-BE" sz="2000" dirty="0" err="1"/>
+              <a:t>ability</a:t>
+            </a:r>
+            <a:r>
+              <a:rPr lang="nl-BE" sz="2000" dirty="0"/>
+              <a:t> of a </a:t>
+            </a:r>
+            <a:r>
+              <a:rPr lang="nl-BE" sz="2000" dirty="0" err="1"/>
+              <a:t>chemical</a:t>
+            </a:r>
+            <a:r>
+              <a:rPr lang="nl-BE" sz="2000" dirty="0"/>
+              <a:t> test agent </a:t>
+            </a:r>
+            <a:r>
+              <a:rPr lang="nl-BE" sz="2000" dirty="0" err="1"/>
+              <a:t>to</a:t>
+            </a:r>
+            <a:r>
+              <a:rPr lang="nl-BE" sz="2000" dirty="0"/>
+              <a:t> </a:t>
+            </a:r>
+            <a:r>
+              <a:rPr lang="nl-BE" sz="2000" dirty="0" err="1"/>
+              <a:t>induce</a:t>
+            </a:r>
+            <a:r>
+              <a:rPr lang="nl-BE" sz="2000" dirty="0"/>
+              <a:t> DNA </a:t>
+            </a:r>
+            <a:r>
+              <a:rPr lang="nl-BE" sz="2000" dirty="0" err="1"/>
+              <a:t>damage</a:t>
+            </a:r>
+            <a:endParaRPr lang="nl-BE" sz="2000" dirty="0"/>
+          </a:p>
+        </p:txBody>
+      </p:sp>
+      <p:sp>
+        <p:nvSpPr>
+          <p:cNvPr id="10" name="Tekstvak 9">
             <a:extLst>
               <a:ext uri="{FF2B5EF4-FFF2-40B4-BE49-F238E27FC236}">
-                <a16:creationId xmlns:a16="http://schemas.microsoft.com/office/drawing/2014/main" id="{74B25947-9FBD-4735-9AE1-ED393740821F}"/>
+                <a16:creationId xmlns:a16="http://schemas.microsoft.com/office/drawing/2014/main" id="{F9AF6A87-507F-4E2E-8A2A-840080D13776}"/>
               </a:ext>
             </a:extLst>
           </p:cNvPr>
-          <p:cNvSpPr>
-            <a:spLocks noGrp="1"/>
-          </p:cNvSpPr>
-          <p:nvPr>
-            <p:ph type="sldNum" sz="quarter" idx="12"/>
-          </p:nvPr>
-        </p:nvSpPr>
-        <p:spPr/>
-        <p:txBody>
-          <a:bodyPr/>
-          <a:lstStyle/>
-          <a:p>
-            <a:fld id="{0A297500-7527-634B-90F4-69D0994C32B4}" type="slidenum">
-              <a:rPr lang="nl-NL" smtClean="0"/>
-              <a:t>12</a:t>
-            </a:fld>
-            <a:endParaRPr lang="nl-NL"/>
-          </a:p>
-        </p:txBody>
-      </p:sp>
-      <p:sp>
-        <p:nvSpPr>
-          <p:cNvPr id="6" name="Tijdelijke aanduiding voor afbeelding 5">
+          <p:cNvSpPr txBox="1"/>
+          <p:nvPr/>
+        </p:nvSpPr>
+        <p:spPr>
+          <a:xfrm>
+            <a:off x="159798" y="58771"/>
+            <a:ext cx="5832629" cy="276999"/>
+          </a:xfrm>
+          <a:prstGeom prst="rect">
+            <a:avLst/>
+          </a:prstGeom>
+          <a:noFill/>
+        </p:spPr>
+        <p:txBody>
+          <a:bodyPr wrap="square" rtlCol="0">
+            <a:spAutoFit/>
+          </a:bodyPr>
+          <a:lstStyle/>
+          <a:p>
+            <a:r>
+              <a:rPr lang="nl-BE" sz="1200" dirty="0">
+                <a:solidFill>
+                  <a:srgbClr val="1D8DB0"/>
+                </a:solidFill>
+              </a:rPr>
+              <a:t>J. </a:t>
+            </a:r>
+            <a:r>
+              <a:rPr lang="nl-BE" sz="1200" dirty="0" err="1">
+                <a:solidFill>
+                  <a:srgbClr val="1D8DB0"/>
+                </a:solidFill>
+              </a:rPr>
+              <a:t>Neirynck</a:t>
+            </a:r>
+            <a:r>
+              <a:rPr lang="nl-BE" sz="1200" dirty="0">
+                <a:solidFill>
+                  <a:srgbClr val="1D8DB0"/>
+                </a:solidFill>
+              </a:rPr>
+              <a:t>, F. Van </a:t>
+            </a:r>
+            <a:r>
+              <a:rPr lang="nl-BE" sz="1200" dirty="0" err="1">
+                <a:solidFill>
+                  <a:srgbClr val="1D8DB0"/>
+                </a:solidFill>
+              </a:rPr>
+              <a:t>Eecke</a:t>
+            </a:r>
+            <a:r>
+              <a:rPr lang="nl-BE" sz="1200" dirty="0">
+                <a:solidFill>
+                  <a:srgbClr val="1D8DB0"/>
+                </a:solidFill>
+              </a:rPr>
+              <a:t> &amp; R. Vrielynck</a:t>
+            </a:r>
+          </a:p>
+        </p:txBody>
+      </p:sp>
+      <p:sp>
+        <p:nvSpPr>
+          <p:cNvPr id="11" name="Tekstvak 10">
             <a:extLst>
               <a:ext uri="{FF2B5EF4-FFF2-40B4-BE49-F238E27FC236}">
-                <a16:creationId xmlns:a16="http://schemas.microsoft.com/office/drawing/2014/main" id="{5275FCF6-597C-42C7-8DFD-B54FDE863E6B}"/>
+                <a16:creationId xmlns:a16="http://schemas.microsoft.com/office/drawing/2014/main" id="{02C83A39-3DA1-4516-B834-3C3D5F8552F0}"/>
               </a:ext>
             </a:extLst>
           </p:cNvPr>
-          <p:cNvSpPr>
-            <a:spLocks noGrp="1"/>
-          </p:cNvSpPr>
-          <p:nvPr>
-            <p:ph type="pic" sz="quarter" idx="13"/>
-          </p:nvPr>
-        </p:nvSpPr>
-        <p:spPr/>
-      </p:sp>
-      <p:sp>
-        <p:nvSpPr>
-          <p:cNvPr id="7" name="Tijdelijke aanduiding voor afbeelding 6">
-            <a:extLst>
-              <a:ext uri="{FF2B5EF4-FFF2-40B4-BE49-F238E27FC236}">
-                <a16:creationId xmlns:a16="http://schemas.microsoft.com/office/drawing/2014/main" id="{8EE963F9-2796-4544-B389-0EF584315BE6}"/>
-              </a:ext>
-            </a:extLst>
-          </p:cNvPr>
-          <p:cNvSpPr>
-            <a:spLocks noGrp="1"/>
-          </p:cNvSpPr>
-          <p:nvPr>
-            <p:ph type="pic" sz="quarter" idx="14"/>
-          </p:nvPr>
-        </p:nvSpPr>
-        <p:spPr/>
+          <p:cNvSpPr txBox="1"/>
+          <p:nvPr/>
+        </p:nvSpPr>
+        <p:spPr>
+          <a:xfrm>
+            <a:off x="576000" y="6356412"/>
+            <a:ext cx="10351364" cy="315471"/>
+          </a:xfrm>
+          <a:prstGeom prst="rect">
+            <a:avLst/>
+          </a:prstGeom>
+          <a:noFill/>
+        </p:spPr>
+        <p:txBody>
+          <a:bodyPr wrap="square" rtlCol="0">
+            <a:spAutoFit/>
+          </a:bodyPr>
+          <a:lstStyle/>
+          <a:p>
+            <a:r>
+              <a:rPr lang="nl-BE" sz="1450" dirty="0" err="1">
+                <a:solidFill>
+                  <a:schemeClr val="bg1"/>
+                </a:solidFill>
+              </a:rPr>
+              <a:t>Introduction</a:t>
+            </a:r>
+            <a:r>
+              <a:rPr lang="nl-BE" sz="1450" dirty="0">
+                <a:solidFill>
+                  <a:schemeClr val="bg1"/>
+                </a:solidFill>
+              </a:rPr>
+              <a:t>	</a:t>
+            </a:r>
+            <a:r>
+              <a:rPr lang="nl-BE" sz="1450" b="1" dirty="0">
+                <a:solidFill>
+                  <a:schemeClr val="bg1"/>
+                </a:solidFill>
+              </a:rPr>
+              <a:t>	Framework</a:t>
+            </a:r>
+            <a:r>
+              <a:rPr lang="nl-BE" sz="1450" dirty="0">
+                <a:solidFill>
+                  <a:schemeClr val="bg1"/>
+                </a:solidFill>
+              </a:rPr>
+              <a:t>		</a:t>
+            </a:r>
+            <a:r>
+              <a:rPr lang="nl-BE" sz="1450" dirty="0" err="1">
+                <a:solidFill>
+                  <a:schemeClr val="bg1"/>
+                </a:solidFill>
+              </a:rPr>
+              <a:t>Techniques</a:t>
+            </a:r>
+            <a:r>
+              <a:rPr lang="nl-BE" sz="1450" dirty="0">
+                <a:solidFill>
+                  <a:schemeClr val="bg1"/>
+                </a:solidFill>
+              </a:rPr>
+              <a:t> &amp; </a:t>
+            </a:r>
+            <a:r>
+              <a:rPr lang="nl-BE" sz="1450" dirty="0" err="1">
+                <a:solidFill>
+                  <a:schemeClr val="bg1"/>
+                </a:solidFill>
+              </a:rPr>
+              <a:t>Results</a:t>
+            </a:r>
+            <a:r>
+              <a:rPr lang="nl-BE" sz="1450" dirty="0">
+                <a:solidFill>
+                  <a:schemeClr val="bg1"/>
+                </a:solidFill>
+              </a:rPr>
+              <a:t>			Summary</a:t>
+            </a:r>
+          </a:p>
+        </p:txBody>
       </p:sp>
     </p:spTree>
     <p:extLst>
       <p:ext uri="{BB962C8B-B14F-4D97-AF65-F5344CB8AC3E}">
-        <p14:creationId xmlns:p14="http://schemas.microsoft.com/office/powerpoint/2010/main" val="1103729882"/>
+        <p14:creationId xmlns:p14="http://schemas.microsoft.com/office/powerpoint/2010/main" val="2708186672"/>
       </p:ext>
     </p:extLst>
   </p:cSld>
@@ -8003,10 +8287,10 @@
       </p:grpSpPr>
       <p:sp>
         <p:nvSpPr>
-          <p:cNvPr id="7" name="Tijdelijke aanduiding voor dianummer 23">
+          <p:cNvPr id="2" name="Titel 1">
             <a:extLst>
               <a:ext uri="{FF2B5EF4-FFF2-40B4-BE49-F238E27FC236}">
-                <a16:creationId xmlns:a16="http://schemas.microsoft.com/office/drawing/2014/main" id="{E7BA9955-551E-4B72-9196-84FDFE87439B}"/>
+                <a16:creationId xmlns:a16="http://schemas.microsoft.com/office/drawing/2014/main" id="{069A9DF7-0F9D-4549-B4E3-66F98F66FF7B}"/>
               </a:ext>
             </a:extLst>
           </p:cNvPr>
@@ -8014,45 +8298,52 @@
             <a:spLocks noGrp="1"/>
           </p:cNvSpPr>
           <p:nvPr>
-            <p:ph type="sldNum" sz="quarter" idx="12"/>
-          </p:nvPr>
-        </p:nvSpPr>
-        <p:spPr>
-          <a:xfrm>
-            <a:off x="11544000" y="-126730"/>
-            <a:ext cx="648000" cy="648000"/>
-          </a:xfrm>
-        </p:spPr>
+            <p:ph type="title"/>
+          </p:nvPr>
+        </p:nvSpPr>
+        <p:spPr/>
         <p:txBody>
           <a:bodyPr/>
           <a:lstStyle/>
           <a:p>
-            <a:fld id="{CF179DAE-D0A6-40C3-B8BC-6A97C268D03A}" type="slidenum">
-              <a:rPr lang="nl-NL" sz="1200" smtClean="0">
-                <a:solidFill>
-                  <a:srgbClr val="1D8DB0"/>
-                </a:solidFill>
-              </a:rPr>
-              <a:pPr/>
-              <a:t>13</a:t>
-            </a:fld>
-            <a:r>
-              <a:rPr lang="nl-NL" sz="1200" dirty="0">
-                <a:solidFill>
-                  <a:srgbClr val="1D8DB0"/>
-                </a:solidFill>
-              </a:rPr>
-              <a:t>/31</a:t>
-            </a:r>
-          </a:p>
-        </p:txBody>
-      </p:sp>
-      <p:sp>
-        <p:nvSpPr>
-          <p:cNvPr id="9" name="Titel 4">
+            <a:r>
+              <a:rPr lang="nl-NL" dirty="0">
+                <a:latin typeface="Arial"/>
+                <a:cs typeface="Arial"/>
+              </a:rPr>
+              <a:t>Parameters </a:t>
+            </a:r>
+            <a:r>
+              <a:rPr lang="nl-NL" dirty="0" err="1">
+                <a:latin typeface="Arial"/>
+                <a:cs typeface="Arial"/>
+              </a:rPr>
+              <a:t>influcencing</a:t>
+            </a:r>
+            <a:r>
+              <a:rPr lang="nl-NL" dirty="0">
+                <a:latin typeface="Arial"/>
+                <a:cs typeface="Arial"/>
+              </a:rPr>
+              <a:t> </a:t>
+            </a:r>
+            <a:r>
+              <a:rPr lang="nl-NL" dirty="0" err="1">
+                <a:latin typeface="Arial"/>
+                <a:cs typeface="Arial"/>
+              </a:rPr>
+              <a:t>toxicity</a:t>
+            </a:r>
+            <a:endParaRPr lang="nl-NL" dirty="0" err="1"/>
+          </a:p>
+        </p:txBody>
+      </p:sp>
+      <p:sp>
+        <p:nvSpPr>
+          <p:cNvPr id="3" name="Tijdelijke aanduiding voor tekst 2">
             <a:extLst>
               <a:ext uri="{FF2B5EF4-FFF2-40B4-BE49-F238E27FC236}">
-                <a16:creationId xmlns:a16="http://schemas.microsoft.com/office/drawing/2014/main" id="{32C054A8-9043-41C9-BA29-6C11E3B87A6D}"/>
+                <a16:creationId xmlns:a16="http://schemas.microsoft.com/office/drawing/2014/main" id="{0765C0FE-D1DD-43F6-A1E8-FF2D7256F7B0}"/>
               </a:ext>
             </a:extLst>
           </p:cNvPr>
@@ -8060,52 +8351,24 @@
             <a:spLocks noGrp="1"/>
           </p:cNvSpPr>
           <p:nvPr>
-            <p:ph type="title"/>
-          </p:nvPr>
-        </p:nvSpPr>
-        <p:spPr>
-          <a:xfrm>
-            <a:off x="576263" y="336550"/>
-            <a:ext cx="11041062" cy="1152525"/>
-          </a:xfrm>
-        </p:spPr>
+            <p:ph type="body" idx="1"/>
+          </p:nvPr>
+        </p:nvSpPr>
+        <p:spPr/>
         <p:txBody>
           <a:bodyPr/>
           <a:lstStyle/>
           <a:p>
-            <a:r>
-              <a:rPr lang="nl-BE" dirty="0" err="1">
-                <a:latin typeface="Arial"/>
-                <a:cs typeface="Arial"/>
-              </a:rPr>
-              <a:t>Dose</a:t>
-            </a:r>
-            <a:r>
-              <a:rPr lang="nl-BE" dirty="0">
-                <a:latin typeface="Arial"/>
-                <a:cs typeface="Arial"/>
-              </a:rPr>
-              <a:t> </a:t>
-            </a:r>
-            <a:r>
-              <a:rPr lang="nl-BE" dirty="0" err="1">
-                <a:latin typeface="Arial"/>
-                <a:cs typeface="Arial"/>
-              </a:rPr>
-              <a:t>dependence</a:t>
-            </a:r>
-            <a:endParaRPr lang="nl-BE" dirty="0" err="1">
-              <a:cs typeface="Arial"/>
-            </a:endParaRPr>
-          </a:p>
-        </p:txBody>
-      </p:sp>
-      <p:sp>
-        <p:nvSpPr>
-          <p:cNvPr id="8" name="Tijdelijke aanduiding voor inhoud 1">
+            <a:endParaRPr lang="nl-NL"/>
+          </a:p>
+        </p:txBody>
+      </p:sp>
+      <p:sp>
+        <p:nvSpPr>
+          <p:cNvPr id="4" name="Tijdelijke aanduiding voor voettekst 3">
             <a:extLst>
               <a:ext uri="{FF2B5EF4-FFF2-40B4-BE49-F238E27FC236}">
-                <a16:creationId xmlns:a16="http://schemas.microsoft.com/office/drawing/2014/main" id="{FD48FE27-13D3-407C-9CF5-D7CAC1400D54}"/>
+                <a16:creationId xmlns:a16="http://schemas.microsoft.com/office/drawing/2014/main" id="{E63340FA-5B57-4924-A4D1-10B8E5D14A4C}"/>
               </a:ext>
             </a:extLst>
           </p:cNvPr>
@@ -8113,530 +8376,90 @@
             <a:spLocks noGrp="1"/>
           </p:cNvSpPr>
           <p:nvPr>
-            <p:ph idx="1"/>
-          </p:nvPr>
-        </p:nvSpPr>
-        <p:spPr>
-          <a:xfrm>
-            <a:off x="576000" y="1656000"/>
-            <a:ext cx="11041200" cy="4043464"/>
-          </a:xfrm>
-        </p:spPr>
-        <p:txBody>
-          <a:bodyPr vert="horz" lIns="91440" tIns="45720" rIns="91440" bIns="45720" rtlCol="0" anchor="t">
-            <a:normAutofit/>
-          </a:bodyPr>
-          <a:lstStyle/>
-          <a:p>
-            <a:r>
-              <a:rPr lang="nl-BE" sz="2000" dirty="0" err="1">
-                <a:latin typeface="Arial"/>
-                <a:cs typeface="Arial"/>
-              </a:rPr>
-              <a:t>Not</a:t>
-            </a:r>
-            <a:r>
-              <a:rPr lang="nl-BE" sz="2000" dirty="0">
-                <a:latin typeface="Arial"/>
-                <a:cs typeface="Arial"/>
-              </a:rPr>
-              <a:t> </a:t>
-            </a:r>
-            <a:r>
-              <a:rPr lang="nl-BE" sz="2000" dirty="0" err="1">
-                <a:latin typeface="Arial"/>
-                <a:cs typeface="Arial"/>
-              </a:rPr>
-              <a:t>dependent</a:t>
-            </a:r>
-            <a:r>
-              <a:rPr lang="nl-BE" sz="2000" dirty="0">
-                <a:latin typeface="Arial"/>
-                <a:cs typeface="Arial"/>
-              </a:rPr>
-              <a:t> on </a:t>
-            </a:r>
-            <a:r>
-              <a:rPr lang="nl-BE" sz="2000" dirty="0" err="1">
-                <a:latin typeface="Arial"/>
-                <a:cs typeface="Arial"/>
-              </a:rPr>
-              <a:t>mass</a:t>
-            </a:r>
-            <a:r>
-              <a:rPr lang="nl-BE" sz="2000" dirty="0">
-                <a:latin typeface="Arial"/>
-                <a:cs typeface="Arial"/>
-              </a:rPr>
-              <a:t> </a:t>
-            </a:r>
-            <a:r>
-              <a:rPr lang="nl-BE" sz="2000" dirty="0" err="1">
-                <a:latin typeface="Arial"/>
-                <a:cs typeface="Arial"/>
-              </a:rPr>
-              <a:t>dose</a:t>
-            </a:r>
-            <a:endParaRPr lang="nl-BE" sz="2000" dirty="0" err="1">
-              <a:cs typeface="Arial"/>
-            </a:endParaRPr>
-          </a:p>
-          <a:p>
-            <a:r>
-              <a:rPr lang="nl-BE" sz="2000" dirty="0">
-                <a:latin typeface="Arial"/>
-                <a:cs typeface="Arial"/>
-              </a:rPr>
-              <a:t>Surface is </a:t>
-            </a:r>
-            <a:r>
-              <a:rPr lang="nl-BE" sz="2000" dirty="0" err="1">
-                <a:latin typeface="Arial"/>
-                <a:cs typeface="Arial"/>
-              </a:rPr>
-              <a:t>reactive</a:t>
-            </a:r>
-            <a:r>
-              <a:rPr lang="nl-BE" sz="2000" dirty="0">
-                <a:latin typeface="Arial"/>
-                <a:cs typeface="Arial"/>
-              </a:rPr>
-              <a:t>, </a:t>
-            </a:r>
-            <a:r>
-              <a:rPr lang="nl-BE" sz="2000" dirty="0" err="1">
-                <a:latin typeface="Arial"/>
-                <a:cs typeface="Arial"/>
-              </a:rPr>
-              <a:t>so</a:t>
-            </a:r>
-            <a:r>
-              <a:rPr lang="nl-BE" sz="2000" dirty="0">
-                <a:latin typeface="Arial"/>
-                <a:cs typeface="Arial"/>
-              </a:rPr>
-              <a:t> small </a:t>
-            </a:r>
-            <a:r>
-              <a:rPr lang="nl-BE" sz="2000" dirty="0" err="1">
-                <a:latin typeface="Arial"/>
-                <a:cs typeface="Arial"/>
-              </a:rPr>
-              <a:t>particles</a:t>
-            </a:r>
-            <a:r>
-              <a:rPr lang="nl-BE" sz="2000" dirty="0">
-                <a:latin typeface="Arial"/>
-                <a:cs typeface="Arial"/>
-              </a:rPr>
-              <a:t> at a low </a:t>
-            </a:r>
-            <a:r>
-              <a:rPr lang="nl-BE" sz="2000" dirty="0" err="1">
-                <a:latin typeface="Arial"/>
-                <a:cs typeface="Arial"/>
-              </a:rPr>
-              <a:t>mass</a:t>
-            </a:r>
-            <a:r>
-              <a:rPr lang="nl-BE" sz="2000" dirty="0">
-                <a:latin typeface="Arial"/>
-                <a:cs typeface="Arial"/>
-              </a:rPr>
-              <a:t> </a:t>
-            </a:r>
-            <a:r>
-              <a:rPr lang="nl-BE" sz="2000" dirty="0" err="1">
-                <a:latin typeface="Arial"/>
-                <a:cs typeface="Arial"/>
-              </a:rPr>
-              <a:t>dose</a:t>
-            </a:r>
-            <a:r>
-              <a:rPr lang="nl-BE" sz="2000" dirty="0">
-                <a:latin typeface="Arial"/>
-                <a:cs typeface="Arial"/>
-              </a:rPr>
-              <a:t> </a:t>
-            </a:r>
-            <a:r>
-              <a:rPr lang="nl-BE" sz="2000" dirty="0" err="1">
-                <a:latin typeface="Arial"/>
-                <a:cs typeface="Arial"/>
-              </a:rPr>
-              <a:t>can</a:t>
-            </a:r>
-            <a:r>
-              <a:rPr lang="nl-BE" sz="2000" dirty="0">
-                <a:latin typeface="Arial"/>
-                <a:cs typeface="Arial"/>
-              </a:rPr>
-              <a:t> </a:t>
-            </a:r>
-            <a:r>
-              <a:rPr lang="nl-BE" sz="2000" dirty="0" err="1">
-                <a:latin typeface="Arial"/>
-                <a:cs typeface="Arial"/>
-              </a:rPr>
-              <a:t>be</a:t>
-            </a:r>
-            <a:r>
-              <a:rPr lang="nl-BE" sz="2000" dirty="0">
-                <a:latin typeface="Arial"/>
-                <a:cs typeface="Arial"/>
-              </a:rPr>
-              <a:t> as </a:t>
-            </a:r>
-            <a:r>
-              <a:rPr lang="nl-BE" sz="2000" dirty="0" err="1">
-                <a:latin typeface="Arial"/>
-                <a:cs typeface="Arial"/>
-              </a:rPr>
-              <a:t>toxic</a:t>
-            </a:r>
-            <a:r>
-              <a:rPr lang="nl-BE" sz="2000" dirty="0">
-                <a:latin typeface="Arial"/>
-                <a:cs typeface="Arial"/>
-              </a:rPr>
-              <a:t> al </a:t>
-            </a:r>
-            <a:r>
-              <a:rPr lang="nl-BE" sz="2000" dirty="0" err="1">
-                <a:latin typeface="Arial"/>
-                <a:cs typeface="Arial"/>
-              </a:rPr>
-              <a:t>larger</a:t>
-            </a:r>
-            <a:r>
-              <a:rPr lang="nl-BE" sz="2000" dirty="0">
-                <a:latin typeface="Arial"/>
-                <a:cs typeface="Arial"/>
-              </a:rPr>
-              <a:t> </a:t>
-            </a:r>
-            <a:r>
-              <a:rPr lang="nl-BE" sz="2000" dirty="0" err="1">
-                <a:latin typeface="Arial"/>
-                <a:cs typeface="Arial"/>
-              </a:rPr>
-              <a:t>particles</a:t>
-            </a:r>
-            <a:r>
-              <a:rPr lang="nl-BE" sz="2000" dirty="0">
-                <a:latin typeface="Arial"/>
-                <a:cs typeface="Arial"/>
-              </a:rPr>
-              <a:t> </a:t>
-            </a:r>
-            <a:r>
-              <a:rPr lang="nl-BE" sz="2000" dirty="0" err="1">
-                <a:latin typeface="Arial"/>
-                <a:cs typeface="Arial"/>
-              </a:rPr>
-              <a:t>with</a:t>
-            </a:r>
-            <a:r>
-              <a:rPr lang="nl-BE" sz="2000" dirty="0">
-                <a:latin typeface="Arial"/>
-                <a:cs typeface="Arial"/>
-              </a:rPr>
-              <a:t> a </a:t>
-            </a:r>
-            <a:r>
-              <a:rPr lang="nl-BE" sz="2000" dirty="0" err="1">
-                <a:latin typeface="Arial"/>
-                <a:cs typeface="Arial"/>
-              </a:rPr>
-              <a:t>higer</a:t>
-            </a:r>
-            <a:r>
-              <a:rPr lang="nl-BE" sz="2000" dirty="0">
-                <a:latin typeface="Arial"/>
-                <a:cs typeface="Arial"/>
-              </a:rPr>
-              <a:t> </a:t>
-            </a:r>
-            <a:r>
-              <a:rPr lang="nl-BE" sz="2000" dirty="0" err="1">
-                <a:latin typeface="Arial"/>
-                <a:cs typeface="Arial"/>
-              </a:rPr>
-              <a:t>mass</a:t>
-            </a:r>
-            <a:r>
-              <a:rPr lang="nl-BE" sz="2000" dirty="0">
-                <a:latin typeface="Arial"/>
-                <a:cs typeface="Arial"/>
-              </a:rPr>
-              <a:t> </a:t>
-            </a:r>
-            <a:r>
-              <a:rPr lang="nl-BE" sz="2000" dirty="0" err="1">
-                <a:latin typeface="Arial"/>
-                <a:cs typeface="Arial"/>
-              </a:rPr>
-              <a:t>dose</a:t>
-            </a:r>
-          </a:p>
-          <a:p>
-            <a:r>
-              <a:rPr lang="nl-BE" sz="2000" dirty="0">
-                <a:latin typeface="Arial"/>
-                <a:cs typeface="Arial"/>
-              </a:rPr>
-              <a:t>Surface </a:t>
-            </a:r>
-            <a:r>
-              <a:rPr lang="nl-BE" sz="2000" dirty="0" err="1">
-                <a:latin typeface="Arial"/>
-                <a:cs typeface="Arial"/>
-              </a:rPr>
-              <a:t>dose</a:t>
-            </a:r>
-            <a:r>
-              <a:rPr lang="nl-BE" sz="2000" dirty="0">
-                <a:latin typeface="Arial"/>
-                <a:cs typeface="Arial"/>
-              </a:rPr>
-              <a:t> is </a:t>
-            </a:r>
-            <a:r>
-              <a:rPr lang="nl-BE" sz="2000" dirty="0" err="1">
-                <a:latin typeface="Arial"/>
-                <a:cs typeface="Arial"/>
-              </a:rPr>
-              <a:t>what</a:t>
-            </a:r>
-            <a:r>
-              <a:rPr lang="nl-BE" sz="2000" dirty="0">
-                <a:latin typeface="Arial"/>
-                <a:cs typeface="Arial"/>
-              </a:rPr>
-              <a:t> </a:t>
-            </a:r>
-            <a:r>
-              <a:rPr lang="nl-BE" sz="2000" dirty="0" err="1">
-                <a:latin typeface="Arial"/>
-                <a:cs typeface="Arial"/>
-              </a:rPr>
-              <a:t>makes</a:t>
-            </a:r>
-            <a:r>
-              <a:rPr lang="nl-BE" sz="2000" dirty="0">
-                <a:latin typeface="Arial"/>
-                <a:cs typeface="Arial"/>
-              </a:rPr>
-              <a:t> </a:t>
-            </a:r>
-            <a:r>
-              <a:rPr lang="nl-BE" sz="2000" dirty="0" err="1">
-                <a:latin typeface="Arial"/>
-                <a:cs typeface="Arial"/>
-              </a:rPr>
-              <a:t>influences</a:t>
-            </a:r>
-            <a:r>
-              <a:rPr lang="nl-BE" sz="2000" dirty="0">
-                <a:latin typeface="Arial"/>
-                <a:cs typeface="Arial"/>
-              </a:rPr>
-              <a:t> </a:t>
-            </a:r>
-            <a:r>
-              <a:rPr lang="nl-BE" sz="2000" dirty="0" err="1">
-                <a:latin typeface="Arial"/>
-                <a:cs typeface="Arial"/>
-              </a:rPr>
-              <a:t>the</a:t>
-            </a:r>
-            <a:r>
-              <a:rPr lang="nl-BE" sz="2000" dirty="0">
-                <a:latin typeface="Arial"/>
-                <a:cs typeface="Arial"/>
-              </a:rPr>
-              <a:t> </a:t>
-            </a:r>
-            <a:r>
-              <a:rPr lang="nl-BE" sz="2000" dirty="0" err="1">
-                <a:latin typeface="Arial"/>
-                <a:cs typeface="Arial"/>
-              </a:rPr>
-              <a:t>toxicity</a:t>
-            </a:r>
-          </a:p>
-        </p:txBody>
-      </p:sp>
-      <p:sp>
-        <p:nvSpPr>
-          <p:cNvPr id="10" name="Tekstvak 9">
+            <p:ph type="ftr" sz="quarter" idx="11"/>
+          </p:nvPr>
+        </p:nvSpPr>
+        <p:spPr/>
+        <p:txBody>
+          <a:bodyPr/>
+          <a:lstStyle/>
+          <a:p>
+            <a:r>
+              <a:rPr lang="nl-NL"/>
+              <a:t>Faculteit, departement, dienst …</a:t>
+            </a:r>
+          </a:p>
+        </p:txBody>
+      </p:sp>
+      <p:sp>
+        <p:nvSpPr>
+          <p:cNvPr id="5" name="Tijdelijke aanduiding voor dianummer 4">
             <a:extLst>
               <a:ext uri="{FF2B5EF4-FFF2-40B4-BE49-F238E27FC236}">
-                <a16:creationId xmlns:a16="http://schemas.microsoft.com/office/drawing/2014/main" id="{F9AF6A87-507F-4E2E-8A2A-840080D13776}"/>
+                <a16:creationId xmlns:a16="http://schemas.microsoft.com/office/drawing/2014/main" id="{74B25947-9FBD-4735-9AE1-ED393740821F}"/>
               </a:ext>
             </a:extLst>
           </p:cNvPr>
-          <p:cNvSpPr txBox="1"/>
-          <p:nvPr/>
-        </p:nvSpPr>
-        <p:spPr>
-          <a:xfrm>
-            <a:off x="159798" y="58771"/>
-            <a:ext cx="5832629" cy="276999"/>
-          </a:xfrm>
-          <a:prstGeom prst="rect">
-            <a:avLst/>
-          </a:prstGeom>
-          <a:noFill/>
-        </p:spPr>
-        <p:txBody>
-          <a:bodyPr wrap="square" rtlCol="0">
-            <a:spAutoFit/>
-          </a:bodyPr>
-          <a:lstStyle/>
-          <a:p>
-            <a:r>
-              <a:rPr lang="nl-BE" sz="1200" dirty="0">
-                <a:solidFill>
-                  <a:srgbClr val="1D8DB0"/>
-                </a:solidFill>
-              </a:rPr>
-              <a:t>J. </a:t>
-            </a:r>
-            <a:r>
-              <a:rPr lang="nl-BE" sz="1200" dirty="0" err="1">
-                <a:solidFill>
-                  <a:srgbClr val="1D8DB0"/>
-                </a:solidFill>
-              </a:rPr>
-              <a:t>Neirynck</a:t>
-            </a:r>
-            <a:r>
-              <a:rPr lang="nl-BE" sz="1200" dirty="0">
-                <a:solidFill>
-                  <a:srgbClr val="1D8DB0"/>
-                </a:solidFill>
-              </a:rPr>
-              <a:t>, F. Van </a:t>
-            </a:r>
-            <a:r>
-              <a:rPr lang="nl-BE" sz="1200" dirty="0" err="1">
-                <a:solidFill>
-                  <a:srgbClr val="1D8DB0"/>
-                </a:solidFill>
-              </a:rPr>
-              <a:t>Eecke</a:t>
-            </a:r>
-            <a:r>
-              <a:rPr lang="nl-BE" sz="1200" dirty="0">
-                <a:solidFill>
-                  <a:srgbClr val="1D8DB0"/>
-                </a:solidFill>
-              </a:rPr>
-              <a:t> &amp; R. Vrielynck</a:t>
-            </a:r>
-          </a:p>
-        </p:txBody>
-      </p:sp>
-      <p:sp>
-        <p:nvSpPr>
-          <p:cNvPr id="11" name="Tekstvak 10">
+          <p:cNvSpPr>
+            <a:spLocks noGrp="1"/>
+          </p:cNvSpPr>
+          <p:nvPr>
+            <p:ph type="sldNum" sz="quarter" idx="12"/>
+          </p:nvPr>
+        </p:nvSpPr>
+        <p:spPr/>
+        <p:txBody>
+          <a:bodyPr/>
+          <a:lstStyle/>
+          <a:p>
+            <a:fld id="{0A297500-7527-634B-90F4-69D0994C32B4}" type="slidenum">
+              <a:rPr lang="nl-NL" smtClean="0"/>
+              <a:t>13</a:t>
+            </a:fld>
+            <a:endParaRPr lang="nl-NL"/>
+          </a:p>
+        </p:txBody>
+      </p:sp>
+      <p:sp>
+        <p:nvSpPr>
+          <p:cNvPr id="6" name="Tijdelijke aanduiding voor afbeelding 5">
             <a:extLst>
               <a:ext uri="{FF2B5EF4-FFF2-40B4-BE49-F238E27FC236}">
-                <a16:creationId xmlns:a16="http://schemas.microsoft.com/office/drawing/2014/main" id="{02C83A39-3DA1-4516-B834-3C3D5F8552F0}"/>
+                <a16:creationId xmlns:a16="http://schemas.microsoft.com/office/drawing/2014/main" id="{5275FCF6-597C-42C7-8DFD-B54FDE863E6B}"/>
               </a:ext>
             </a:extLst>
           </p:cNvPr>
-          <p:cNvSpPr txBox="1"/>
-          <p:nvPr/>
-        </p:nvSpPr>
-        <p:spPr>
-          <a:xfrm>
-            <a:off x="576000" y="6356412"/>
-            <a:ext cx="10351364" cy="315471"/>
-          </a:xfrm>
-          <a:prstGeom prst="rect">
-            <a:avLst/>
-          </a:prstGeom>
-          <a:noFill/>
-        </p:spPr>
-        <p:txBody>
-          <a:bodyPr wrap="square" rtlCol="0">
-            <a:spAutoFit/>
-          </a:bodyPr>
-          <a:lstStyle/>
-          <a:p>
-            <a:r>
-              <a:rPr lang="nl-BE" sz="1450" dirty="0" err="1">
-                <a:solidFill>
-                  <a:schemeClr val="bg1"/>
-                </a:solidFill>
-              </a:rPr>
-              <a:t>Introduction</a:t>
-            </a:r>
-            <a:r>
-              <a:rPr lang="nl-BE" sz="1450" dirty="0">
-                <a:solidFill>
-                  <a:schemeClr val="bg1"/>
-                </a:solidFill>
-              </a:rPr>
-              <a:t>	</a:t>
-            </a:r>
-            <a:r>
-              <a:rPr lang="nl-BE" sz="1450" b="1" dirty="0">
-                <a:solidFill>
-                  <a:schemeClr val="bg1"/>
-                </a:solidFill>
-              </a:rPr>
-              <a:t>	Framework</a:t>
-            </a:r>
-            <a:r>
-              <a:rPr lang="nl-BE" sz="1450" dirty="0">
-                <a:solidFill>
-                  <a:schemeClr val="bg1"/>
-                </a:solidFill>
-              </a:rPr>
-              <a:t>		</a:t>
-            </a:r>
-            <a:r>
-              <a:rPr lang="nl-BE" sz="1450" dirty="0" err="1">
-                <a:solidFill>
-                  <a:schemeClr val="bg1"/>
-                </a:solidFill>
-              </a:rPr>
-              <a:t>Techniques</a:t>
-            </a:r>
-            <a:r>
-              <a:rPr lang="nl-BE" sz="1450" dirty="0">
-                <a:solidFill>
-                  <a:schemeClr val="bg1"/>
-                </a:solidFill>
-              </a:rPr>
-              <a:t> &amp; </a:t>
-            </a:r>
-            <a:r>
-              <a:rPr lang="nl-BE" sz="1450" dirty="0" err="1">
-                <a:solidFill>
-                  <a:schemeClr val="bg1"/>
-                </a:solidFill>
-              </a:rPr>
-              <a:t>Results</a:t>
-            </a:r>
-            <a:r>
-              <a:rPr lang="nl-BE" sz="1450" dirty="0">
-                <a:solidFill>
-                  <a:schemeClr val="bg1"/>
-                </a:solidFill>
-              </a:rPr>
-              <a:t>			Summary</a:t>
-            </a:r>
-          </a:p>
-        </p:txBody>
+          <p:cNvSpPr>
+            <a:spLocks noGrp="1"/>
+          </p:cNvSpPr>
+          <p:nvPr>
+            <p:ph type="pic" sz="quarter" idx="13"/>
+          </p:nvPr>
+        </p:nvSpPr>
+        <p:spPr/>
+      </p:sp>
+      <p:sp>
+        <p:nvSpPr>
+          <p:cNvPr id="7" name="Tijdelijke aanduiding voor afbeelding 6">
+            <a:extLst>
+              <a:ext uri="{FF2B5EF4-FFF2-40B4-BE49-F238E27FC236}">
+                <a16:creationId xmlns:a16="http://schemas.microsoft.com/office/drawing/2014/main" id="{8EE963F9-2796-4544-B389-0EF584315BE6}"/>
+              </a:ext>
+            </a:extLst>
+          </p:cNvPr>
+          <p:cNvSpPr>
+            <a:spLocks noGrp="1"/>
+          </p:cNvSpPr>
+          <p:nvPr>
+            <p:ph type="pic" sz="quarter" idx="14"/>
+          </p:nvPr>
+        </p:nvSpPr>
+        <p:spPr/>
       </p:sp>
     </p:spTree>
     <p:extLst>
       <p:ext uri="{BB962C8B-B14F-4D97-AF65-F5344CB8AC3E}">
-        <p14:creationId xmlns:p14="http://schemas.microsoft.com/office/powerpoint/2010/main" val="4204038074"/>
+        <p14:creationId xmlns:p14="http://schemas.microsoft.com/office/powerpoint/2010/main" val="1103729882"/>
       </p:ext>
     </p:extLst>
   </p:cSld>
@@ -8665,10 +8488,10 @@
       </p:grpSpPr>
       <p:sp>
         <p:nvSpPr>
-          <p:cNvPr id="2" name="Tijdelijke aanduiding voor inhoud 1">
+          <p:cNvPr id="7" name="Tijdelijke aanduiding voor dianummer 23">
             <a:extLst>
               <a:ext uri="{FF2B5EF4-FFF2-40B4-BE49-F238E27FC236}">
-                <a16:creationId xmlns:a16="http://schemas.microsoft.com/office/drawing/2014/main" id="{DA23FDA8-8B91-4851-BFB1-DD9B789576B1}"/>
+                <a16:creationId xmlns:a16="http://schemas.microsoft.com/office/drawing/2014/main" id="{E7BA9955-551E-4B72-9196-84FDFE87439B}"/>
               </a:ext>
             </a:extLst>
           </p:cNvPr>
@@ -8676,10 +8499,114 @@
             <a:spLocks noGrp="1"/>
           </p:cNvSpPr>
           <p:nvPr>
+            <p:ph type="sldNum" sz="quarter" idx="12"/>
+          </p:nvPr>
+        </p:nvSpPr>
+        <p:spPr>
+          <a:xfrm>
+            <a:off x="11544000" y="-126730"/>
+            <a:ext cx="648000" cy="648000"/>
+          </a:xfrm>
+        </p:spPr>
+        <p:txBody>
+          <a:bodyPr/>
+          <a:lstStyle/>
+          <a:p>
+            <a:fld id="{CF179DAE-D0A6-40C3-B8BC-6A97C268D03A}" type="slidenum">
+              <a:rPr lang="nl-NL" sz="1200" smtClean="0">
+                <a:solidFill>
+                  <a:srgbClr val="1D8DB0"/>
+                </a:solidFill>
+              </a:rPr>
+              <a:pPr/>
+              <a:t>14</a:t>
+            </a:fld>
+            <a:r>
+              <a:rPr lang="nl-NL" sz="1200" dirty="0">
+                <a:solidFill>
+                  <a:srgbClr val="1D8DB0"/>
+                </a:solidFill>
+              </a:rPr>
+              <a:t>/31</a:t>
+            </a:r>
+          </a:p>
+        </p:txBody>
+      </p:sp>
+      <p:sp>
+        <p:nvSpPr>
+          <p:cNvPr id="9" name="Titel 4">
+            <a:extLst>
+              <a:ext uri="{FF2B5EF4-FFF2-40B4-BE49-F238E27FC236}">
+                <a16:creationId xmlns:a16="http://schemas.microsoft.com/office/drawing/2014/main" id="{32C054A8-9043-41C9-BA29-6C11E3B87A6D}"/>
+              </a:ext>
+            </a:extLst>
+          </p:cNvPr>
+          <p:cNvSpPr>
+            <a:spLocks noGrp="1"/>
+          </p:cNvSpPr>
+          <p:nvPr>
+            <p:ph type="title"/>
+          </p:nvPr>
+        </p:nvSpPr>
+        <p:spPr>
+          <a:xfrm>
+            <a:off x="576263" y="336550"/>
+            <a:ext cx="11041062" cy="1152525"/>
+          </a:xfrm>
+        </p:spPr>
+        <p:txBody>
+          <a:bodyPr/>
+          <a:lstStyle/>
+          <a:p>
+            <a:r>
+              <a:rPr lang="nl-BE" dirty="0" err="1">
+                <a:latin typeface="Arial"/>
+                <a:cs typeface="Arial"/>
+              </a:rPr>
+              <a:t>Dose</a:t>
+            </a:r>
+            <a:r>
+              <a:rPr lang="nl-BE" dirty="0">
+                <a:latin typeface="Arial"/>
+                <a:cs typeface="Arial"/>
+              </a:rPr>
+              <a:t> </a:t>
+            </a:r>
+            <a:r>
+              <a:rPr lang="nl-BE" dirty="0" err="1">
+                <a:latin typeface="Arial"/>
+                <a:cs typeface="Arial"/>
+              </a:rPr>
+              <a:t>dependence</a:t>
+            </a:r>
+            <a:endParaRPr lang="nl-BE" dirty="0" err="1">
+              <a:cs typeface="Arial"/>
+            </a:endParaRPr>
+          </a:p>
+        </p:txBody>
+      </p:sp>
+      <p:sp>
+        <p:nvSpPr>
+          <p:cNvPr id="8" name="Tijdelijke aanduiding voor inhoud 1">
+            <a:extLst>
+              <a:ext uri="{FF2B5EF4-FFF2-40B4-BE49-F238E27FC236}">
+                <a16:creationId xmlns:a16="http://schemas.microsoft.com/office/drawing/2014/main" id="{FD48FE27-13D3-407C-9CF5-D7CAC1400D54}"/>
+              </a:ext>
+            </a:extLst>
+          </p:cNvPr>
+          <p:cNvSpPr>
+            <a:spLocks noGrp="1"/>
+          </p:cNvSpPr>
+          <p:nvPr>
             <p:ph idx="1"/>
           </p:nvPr>
         </p:nvSpPr>
-        <p:spPr/>
+        <p:spPr>
+          <a:xfrm>
+            <a:off x="576000" y="1656000"/>
+            <a:ext cx="11041200" cy="4043464"/>
+          </a:xfrm>
+        </p:spPr>
         <p:txBody>
           <a:bodyPr vert="horz" lIns="91440" tIns="45720" rIns="91440" bIns="45720" rtlCol="0" anchor="t">
             <a:normAutofit/>
@@ -8687,361 +8614,514 @@
           <a:lstStyle/>
           <a:p>
             <a:r>
-              <a:rPr lang="nl-NL" dirty="0">
-                <a:latin typeface="Arial"/>
-                <a:cs typeface="Arial"/>
-              </a:rPr>
-              <a:t>Large </a:t>
-            </a:r>
-            <a:r>
-              <a:rPr lang="nl-NL" dirty="0" err="1">
-                <a:latin typeface="Arial"/>
-                <a:cs typeface="Arial"/>
-              </a:rPr>
-              <a:t>concentration</a:t>
-            </a:r>
-            <a:r>
-              <a:rPr lang="nl-NL" dirty="0">
-                <a:latin typeface="Arial"/>
-                <a:cs typeface="Arial"/>
-              </a:rPr>
-              <a:t> --&gt; </a:t>
-            </a:r>
-            <a:r>
-              <a:rPr lang="nl-NL" dirty="0" err="1">
-                <a:latin typeface="Arial"/>
-                <a:cs typeface="Arial"/>
-              </a:rPr>
-              <a:t>aggregation</a:t>
-            </a:r>
-            <a:r>
-              <a:rPr lang="nl-NL" dirty="0">
-                <a:latin typeface="Arial"/>
-                <a:cs typeface="Arial"/>
-              </a:rPr>
-              <a:t> of </a:t>
-            </a:r>
-            <a:r>
-              <a:rPr lang="nl-NL" dirty="0" err="1">
-                <a:latin typeface="Arial"/>
-                <a:cs typeface="Arial"/>
-              </a:rPr>
-              <a:t>particles</a:t>
-            </a:r>
-          </a:p>
-          <a:p>
-            <a:r>
-              <a:rPr lang="nl-NL" dirty="0" err="1">
-                <a:latin typeface="Arial"/>
-                <a:cs typeface="Arial"/>
-              </a:rPr>
-              <a:t>Larger</a:t>
-            </a:r>
-            <a:r>
-              <a:rPr lang="nl-NL" dirty="0">
+              <a:rPr lang="nl-BE" sz="2000" dirty="0" err="1">
+                <a:latin typeface="Arial"/>
+                <a:cs typeface="Arial"/>
+              </a:rPr>
+              <a:t>Not</a:t>
+            </a:r>
+            <a:r>
+              <a:rPr lang="nl-BE" sz="2000" dirty="0">
                 <a:latin typeface="Arial"/>
                 <a:cs typeface="Arial"/>
               </a:rPr>
               <a:t> </a:t>
             </a:r>
             <a:r>
-              <a:rPr lang="nl-NL" dirty="0" err="1">
-                <a:latin typeface="Arial"/>
-                <a:cs typeface="Arial"/>
-              </a:rPr>
-              <a:t>particles</a:t>
-            </a:r>
-            <a:r>
-              <a:rPr lang="nl-NL" dirty="0">
-                <a:latin typeface="Arial"/>
-                <a:cs typeface="Arial"/>
-              </a:rPr>
-              <a:t>, </a:t>
-            </a:r>
-            <a:r>
-              <a:rPr lang="nl-NL" dirty="0" err="1">
-                <a:latin typeface="Arial"/>
-                <a:cs typeface="Arial"/>
-              </a:rPr>
-              <a:t>less</a:t>
-            </a:r>
-            <a:r>
-              <a:rPr lang="nl-NL" dirty="0">
+              <a:rPr lang="nl-BE" sz="2000" dirty="0" err="1">
+                <a:latin typeface="Arial"/>
+                <a:cs typeface="Arial"/>
+              </a:rPr>
+              <a:t>dependent</a:t>
+            </a:r>
+            <a:r>
+              <a:rPr lang="nl-BE" sz="2000" dirty="0">
+                <a:latin typeface="Arial"/>
+                <a:cs typeface="Arial"/>
+              </a:rPr>
+              <a:t> on </a:t>
+            </a:r>
+            <a:r>
+              <a:rPr lang="nl-BE" sz="2000" dirty="0" err="1">
+                <a:latin typeface="Arial"/>
+                <a:cs typeface="Arial"/>
+              </a:rPr>
+              <a:t>mass</a:t>
+            </a:r>
+            <a:r>
+              <a:rPr lang="nl-BE" sz="2000" dirty="0">
                 <a:latin typeface="Arial"/>
                 <a:cs typeface="Arial"/>
               </a:rPr>
               <a:t> </a:t>
             </a:r>
             <a:r>
-              <a:rPr lang="nl-NL" dirty="0" err="1">
-                <a:latin typeface="Arial"/>
-                <a:cs typeface="Arial"/>
-              </a:rPr>
-              <a:t>surface</a:t>
-            </a:r>
-            <a:r>
-              <a:rPr lang="nl-NL" dirty="0">
-                <a:latin typeface="Arial"/>
-                <a:cs typeface="Arial"/>
-              </a:rPr>
-              <a:t> AND </a:t>
-            </a:r>
-            <a:r>
-              <a:rPr lang="nl-NL" dirty="0" err="1">
-                <a:latin typeface="Arial"/>
-                <a:cs typeface="Arial"/>
-              </a:rPr>
-              <a:t>white</a:t>
-            </a:r>
-            <a:r>
-              <a:rPr lang="nl-NL" dirty="0">
-                <a:latin typeface="Arial"/>
-                <a:cs typeface="Arial"/>
-              </a:rPr>
-              <a:t> </a:t>
-            </a:r>
-            <a:r>
-              <a:rPr lang="nl-NL" dirty="0" err="1">
-                <a:latin typeface="Arial"/>
-                <a:cs typeface="Arial"/>
-              </a:rPr>
-              <a:t>bloodcells</a:t>
-            </a:r>
-            <a:r>
-              <a:rPr lang="nl-NL" dirty="0">
-                <a:latin typeface="Arial"/>
-                <a:cs typeface="Arial"/>
-              </a:rPr>
-              <a:t> </a:t>
-            </a:r>
-            <a:r>
-              <a:rPr lang="nl-NL" dirty="0" err="1">
-                <a:latin typeface="Arial"/>
-                <a:cs typeface="Arial"/>
-              </a:rPr>
-              <a:t>can</a:t>
-            </a:r>
-            <a:r>
-              <a:rPr lang="nl-NL" dirty="0">
-                <a:latin typeface="Arial"/>
-                <a:cs typeface="Arial"/>
-              </a:rPr>
-              <a:t> </a:t>
-            </a:r>
-            <a:r>
-              <a:rPr lang="nl-NL" dirty="0" err="1">
-                <a:latin typeface="Arial"/>
-                <a:cs typeface="Arial"/>
-              </a:rPr>
-              <a:t>macrophage</a:t>
-            </a:r>
-            <a:r>
-              <a:rPr lang="nl-NL" dirty="0">
-                <a:latin typeface="Arial"/>
-                <a:cs typeface="Arial"/>
-              </a:rPr>
-              <a:t> </a:t>
-            </a:r>
-            <a:r>
-              <a:rPr lang="nl-NL" dirty="0" err="1">
-                <a:latin typeface="Arial"/>
-                <a:cs typeface="Arial"/>
-              </a:rPr>
-              <a:t>the</a:t>
-            </a:r>
-            <a:r>
-              <a:rPr lang="nl-NL" dirty="0">
-                <a:latin typeface="Arial"/>
-                <a:cs typeface="Arial"/>
-              </a:rPr>
-              <a:t> </a:t>
-            </a:r>
-            <a:r>
-              <a:rPr lang="nl-NL" dirty="0" err="1">
-                <a:latin typeface="Arial"/>
-                <a:cs typeface="Arial"/>
-              </a:rPr>
-              <a:t>aggregates</a:t>
-            </a:r>
-            <a:endParaRPr lang="nl-NL" dirty="0" err="1">
+              <a:rPr lang="nl-BE" sz="2000" dirty="0" err="1">
+                <a:latin typeface="Arial"/>
+                <a:cs typeface="Arial"/>
+              </a:rPr>
+              <a:t>dose</a:t>
+            </a:r>
+            <a:endParaRPr lang="nl-BE" sz="2000" dirty="0" err="1">
               <a:cs typeface="Arial"/>
             </a:endParaRPr>
           </a:p>
           <a:p>
             <a:r>
-              <a:rPr lang="nl-NL" dirty="0">
-                <a:latin typeface="Arial"/>
-                <a:cs typeface="Arial"/>
-              </a:rPr>
-              <a:t>Large </a:t>
-            </a:r>
-            <a:r>
-              <a:rPr lang="nl-NL" dirty="0" err="1">
-                <a:latin typeface="Arial"/>
-                <a:cs typeface="Arial"/>
-              </a:rPr>
-              <a:t>concentration</a:t>
-            </a:r>
-            <a:r>
-              <a:rPr lang="nl-NL" dirty="0">
+              <a:rPr lang="nl-BE" sz="2000" dirty="0">
+                <a:latin typeface="Arial"/>
+                <a:cs typeface="Arial"/>
+              </a:rPr>
+              <a:t>Surface is </a:t>
+            </a:r>
+            <a:r>
+              <a:rPr lang="nl-BE" sz="2000" dirty="0" err="1">
+                <a:latin typeface="Arial"/>
+                <a:cs typeface="Arial"/>
+              </a:rPr>
+              <a:t>reactive</a:t>
+            </a:r>
+            <a:r>
+              <a:rPr lang="nl-BE" sz="2000" dirty="0">
+                <a:latin typeface="Arial"/>
+                <a:cs typeface="Arial"/>
+              </a:rPr>
+              <a:t>, </a:t>
+            </a:r>
+            <a:r>
+              <a:rPr lang="nl-BE" sz="2000" dirty="0" err="1">
+                <a:latin typeface="Arial"/>
+                <a:cs typeface="Arial"/>
+              </a:rPr>
+              <a:t>so</a:t>
+            </a:r>
+            <a:r>
+              <a:rPr lang="nl-BE" sz="2000" dirty="0">
+                <a:latin typeface="Arial"/>
+                <a:cs typeface="Arial"/>
+              </a:rPr>
+              <a:t> small </a:t>
+            </a:r>
+            <a:r>
+              <a:rPr lang="nl-BE" sz="2000" dirty="0" err="1">
+                <a:latin typeface="Arial"/>
+                <a:cs typeface="Arial"/>
+              </a:rPr>
+              <a:t>particles</a:t>
+            </a:r>
+            <a:r>
+              <a:rPr lang="nl-BE" sz="2000" dirty="0">
+                <a:latin typeface="Arial"/>
+                <a:cs typeface="Arial"/>
+              </a:rPr>
+              <a:t> at a low </a:t>
+            </a:r>
+            <a:r>
+              <a:rPr lang="nl-BE" sz="2000" dirty="0" err="1">
+                <a:latin typeface="Arial"/>
+                <a:cs typeface="Arial"/>
+              </a:rPr>
+              <a:t>mass</a:t>
+            </a:r>
+            <a:r>
+              <a:rPr lang="nl-BE" sz="2000" dirty="0">
                 <a:latin typeface="Arial"/>
                 <a:cs typeface="Arial"/>
               </a:rPr>
               <a:t> </a:t>
             </a:r>
             <a:r>
-              <a:rPr lang="nl-NL" dirty="0" err="1">
-                <a:latin typeface="Arial"/>
-                <a:cs typeface="Arial"/>
-              </a:rPr>
-              <a:t>results</a:t>
-            </a:r>
-            <a:r>
-              <a:rPr lang="nl-NL" dirty="0">
-                <a:latin typeface="Arial"/>
-                <a:cs typeface="Arial"/>
-              </a:rPr>
-              <a:t> in </a:t>
-            </a:r>
-            <a:r>
-              <a:rPr lang="nl-NL" dirty="0" err="1">
-                <a:latin typeface="Arial"/>
-                <a:cs typeface="Arial"/>
-              </a:rPr>
-              <a:t>less</a:t>
-            </a:r>
-            <a:r>
-              <a:rPr lang="nl-NL" dirty="0">
+              <a:rPr lang="nl-BE" sz="2000" dirty="0" err="1">
+                <a:latin typeface="Arial"/>
+                <a:cs typeface="Arial"/>
+              </a:rPr>
+              <a:t>dose</a:t>
+            </a:r>
+            <a:r>
+              <a:rPr lang="nl-BE" sz="2000" dirty="0">
                 <a:latin typeface="Arial"/>
                 <a:cs typeface="Arial"/>
               </a:rPr>
               <a:t> </a:t>
             </a:r>
             <a:r>
-              <a:rPr lang="nl-NL" dirty="0" err="1">
+              <a:rPr lang="nl-BE" sz="2000" dirty="0" err="1">
+                <a:latin typeface="Arial"/>
+                <a:cs typeface="Arial"/>
+              </a:rPr>
+              <a:t>can</a:t>
+            </a:r>
+            <a:r>
+              <a:rPr lang="nl-BE" sz="2000" dirty="0">
+                <a:latin typeface="Arial"/>
+                <a:cs typeface="Arial"/>
+              </a:rPr>
+              <a:t> </a:t>
+            </a:r>
+            <a:r>
+              <a:rPr lang="nl-BE" sz="2000" dirty="0" err="1">
+                <a:latin typeface="Arial"/>
+                <a:cs typeface="Arial"/>
+              </a:rPr>
+              <a:t>be</a:t>
+            </a:r>
+            <a:r>
+              <a:rPr lang="nl-BE" sz="2000" dirty="0">
+                <a:latin typeface="Arial"/>
+                <a:cs typeface="Arial"/>
+              </a:rPr>
+              <a:t> as </a:t>
+            </a:r>
+            <a:r>
+              <a:rPr lang="nl-BE" sz="2000" dirty="0" err="1">
+                <a:latin typeface="Arial"/>
+                <a:cs typeface="Arial"/>
+              </a:rPr>
+              <a:t>toxic</a:t>
+            </a:r>
+            <a:r>
+              <a:rPr lang="nl-BE" sz="2000" dirty="0">
+                <a:latin typeface="Arial"/>
+                <a:cs typeface="Arial"/>
+              </a:rPr>
+              <a:t> al </a:t>
+            </a:r>
+            <a:r>
+              <a:rPr lang="nl-BE" sz="2000" dirty="0" err="1">
+                <a:latin typeface="Arial"/>
+                <a:cs typeface="Arial"/>
+              </a:rPr>
+              <a:t>larger</a:t>
+            </a:r>
+            <a:r>
+              <a:rPr lang="nl-BE" sz="2000" dirty="0">
+                <a:latin typeface="Arial"/>
+                <a:cs typeface="Arial"/>
+              </a:rPr>
+              <a:t> </a:t>
+            </a:r>
+            <a:r>
+              <a:rPr lang="nl-BE" sz="2000" dirty="0" err="1">
+                <a:latin typeface="Arial"/>
+                <a:cs typeface="Arial"/>
+              </a:rPr>
+              <a:t>particles</a:t>
+            </a:r>
+            <a:r>
+              <a:rPr lang="nl-BE" sz="2000" dirty="0">
+                <a:latin typeface="Arial"/>
+                <a:cs typeface="Arial"/>
+              </a:rPr>
+              <a:t> </a:t>
+            </a:r>
+            <a:r>
+              <a:rPr lang="nl-BE" sz="2000" dirty="0" err="1">
+                <a:latin typeface="Arial"/>
+                <a:cs typeface="Arial"/>
+              </a:rPr>
+              <a:t>with</a:t>
+            </a:r>
+            <a:r>
+              <a:rPr lang="nl-BE" sz="2000" dirty="0">
+                <a:latin typeface="Arial"/>
+                <a:cs typeface="Arial"/>
+              </a:rPr>
+              <a:t> a </a:t>
+            </a:r>
+            <a:r>
+              <a:rPr lang="nl-BE" sz="2000" dirty="0" err="1">
+                <a:latin typeface="Arial"/>
+                <a:cs typeface="Arial"/>
+              </a:rPr>
+              <a:t>higer</a:t>
+            </a:r>
+            <a:r>
+              <a:rPr lang="nl-BE" sz="2000" dirty="0">
+                <a:latin typeface="Arial"/>
+                <a:cs typeface="Arial"/>
+              </a:rPr>
+              <a:t> </a:t>
+            </a:r>
+            <a:r>
+              <a:rPr lang="nl-BE" sz="2000" dirty="0" err="1">
+                <a:latin typeface="Arial"/>
+                <a:cs typeface="Arial"/>
+              </a:rPr>
+              <a:t>mass</a:t>
+            </a:r>
+            <a:r>
+              <a:rPr lang="nl-BE" sz="2000" dirty="0">
+                <a:latin typeface="Arial"/>
+                <a:cs typeface="Arial"/>
+              </a:rPr>
+              <a:t> </a:t>
+            </a:r>
+            <a:r>
+              <a:rPr lang="nl-BE" sz="2000" dirty="0" err="1">
+                <a:latin typeface="Arial"/>
+                <a:cs typeface="Arial"/>
+              </a:rPr>
+              <a:t>dose</a:t>
+            </a:r>
+          </a:p>
+          <a:p>
+            <a:r>
+              <a:rPr lang="nl-BE" sz="2000" dirty="0">
+                <a:latin typeface="Arial"/>
+                <a:cs typeface="Arial"/>
+              </a:rPr>
+              <a:t>Surface </a:t>
+            </a:r>
+            <a:r>
+              <a:rPr lang="nl-BE" sz="2000" dirty="0" err="1">
+                <a:latin typeface="Arial"/>
+                <a:cs typeface="Arial"/>
+              </a:rPr>
+              <a:t>dose</a:t>
+            </a:r>
+            <a:r>
+              <a:rPr lang="nl-BE" sz="2000" dirty="0">
+                <a:latin typeface="Arial"/>
+                <a:cs typeface="Arial"/>
+              </a:rPr>
+              <a:t> is </a:t>
+            </a:r>
+            <a:r>
+              <a:rPr lang="nl-BE" sz="2000" dirty="0" err="1">
+                <a:latin typeface="Arial"/>
+                <a:cs typeface="Arial"/>
+              </a:rPr>
+              <a:t>what</a:t>
+            </a:r>
+            <a:r>
+              <a:rPr lang="nl-BE" sz="2000" dirty="0">
+                <a:latin typeface="Arial"/>
+                <a:cs typeface="Arial"/>
+              </a:rPr>
+              <a:t> </a:t>
+            </a:r>
+            <a:r>
+              <a:rPr lang="nl-BE" sz="2000" dirty="0" err="1">
+                <a:latin typeface="Arial"/>
+                <a:cs typeface="Arial"/>
+              </a:rPr>
+              <a:t>makes</a:t>
+            </a:r>
+            <a:r>
+              <a:rPr lang="nl-BE" sz="2000" dirty="0">
+                <a:latin typeface="Arial"/>
+                <a:cs typeface="Arial"/>
+              </a:rPr>
+              <a:t> </a:t>
+            </a:r>
+            <a:r>
+              <a:rPr lang="nl-BE" sz="2000" dirty="0" err="1">
+                <a:latin typeface="Arial"/>
+                <a:cs typeface="Arial"/>
+              </a:rPr>
+              <a:t>influences</a:t>
+            </a:r>
+            <a:r>
+              <a:rPr lang="nl-BE" sz="2000" dirty="0">
+                <a:latin typeface="Arial"/>
+                <a:cs typeface="Arial"/>
+              </a:rPr>
+              <a:t> </a:t>
+            </a:r>
+            <a:r>
+              <a:rPr lang="nl-BE" sz="2000" dirty="0" err="1">
+                <a:latin typeface="Arial"/>
+                <a:cs typeface="Arial"/>
+              </a:rPr>
+              <a:t>the</a:t>
+            </a:r>
+            <a:r>
+              <a:rPr lang="nl-BE" sz="2000" dirty="0">
+                <a:latin typeface="Arial"/>
+                <a:cs typeface="Arial"/>
+              </a:rPr>
+              <a:t> </a:t>
+            </a:r>
+            <a:r>
+              <a:rPr lang="nl-BE" sz="2000" dirty="0" err="1">
                 <a:latin typeface="Arial"/>
                 <a:cs typeface="Arial"/>
               </a:rPr>
               <a:t>toxicity</a:t>
             </a:r>
-            <a:endParaRPr lang="nl-NL" dirty="0" err="1">
-              <a:cs typeface="Arial"/>
-            </a:endParaRPr>
-          </a:p>
-          <a:p>
-            <a:endParaRPr lang="nl-NL" dirty="0">
-              <a:cs typeface="Arial"/>
-            </a:endParaRPr>
-          </a:p>
-        </p:txBody>
-      </p:sp>
-      <p:sp>
-        <p:nvSpPr>
-          <p:cNvPr id="3" name="Tijdelijke aanduiding voor voettekst 2">
+          </a:p>
+        </p:txBody>
+      </p:sp>
+      <p:sp>
+        <p:nvSpPr>
+          <p:cNvPr id="10" name="Tekstvak 9">
             <a:extLst>
               <a:ext uri="{FF2B5EF4-FFF2-40B4-BE49-F238E27FC236}">
-                <a16:creationId xmlns:a16="http://schemas.microsoft.com/office/drawing/2014/main" id="{34BF4704-138D-49F1-B37A-017E77BC0845}"/>
+                <a16:creationId xmlns:a16="http://schemas.microsoft.com/office/drawing/2014/main" id="{F9AF6A87-507F-4E2E-8A2A-840080D13776}"/>
               </a:ext>
             </a:extLst>
           </p:cNvPr>
-          <p:cNvSpPr>
-            <a:spLocks noGrp="1"/>
-          </p:cNvSpPr>
-          <p:nvPr>
-            <p:ph type="ftr" sz="quarter" idx="11"/>
-          </p:nvPr>
-        </p:nvSpPr>
-        <p:spPr/>
-        <p:txBody>
-          <a:bodyPr/>
-          <a:lstStyle/>
-          <a:p>
-            <a:r>
-              <a:rPr lang="nl-NL"/>
-              <a:t>Faculteit, departement, dienst …</a:t>
-            </a:r>
-          </a:p>
-        </p:txBody>
-      </p:sp>
-      <p:sp>
-        <p:nvSpPr>
-          <p:cNvPr id="4" name="Tijdelijke aanduiding voor dianummer 3">
+          <p:cNvSpPr txBox="1"/>
+          <p:nvPr/>
+        </p:nvSpPr>
+        <p:spPr>
+          <a:xfrm>
+            <a:off x="159798" y="58771"/>
+            <a:ext cx="5832629" cy="276999"/>
+          </a:xfrm>
+          <a:prstGeom prst="rect">
+            <a:avLst/>
+          </a:prstGeom>
+          <a:noFill/>
+        </p:spPr>
+        <p:txBody>
+          <a:bodyPr wrap="square" rtlCol="0">
+            <a:spAutoFit/>
+          </a:bodyPr>
+          <a:lstStyle/>
+          <a:p>
+            <a:r>
+              <a:rPr lang="nl-BE" sz="1200" dirty="0">
+                <a:solidFill>
+                  <a:srgbClr val="1D8DB0"/>
+                </a:solidFill>
+              </a:rPr>
+              <a:t>J. </a:t>
+            </a:r>
+            <a:r>
+              <a:rPr lang="nl-BE" sz="1200" dirty="0" err="1">
+                <a:solidFill>
+                  <a:srgbClr val="1D8DB0"/>
+                </a:solidFill>
+              </a:rPr>
+              <a:t>Neirynck</a:t>
+            </a:r>
+            <a:r>
+              <a:rPr lang="nl-BE" sz="1200" dirty="0">
+                <a:solidFill>
+                  <a:srgbClr val="1D8DB0"/>
+                </a:solidFill>
+              </a:rPr>
+              <a:t>, F. Van </a:t>
+            </a:r>
+            <a:r>
+              <a:rPr lang="nl-BE" sz="1200" dirty="0" err="1">
+                <a:solidFill>
+                  <a:srgbClr val="1D8DB0"/>
+                </a:solidFill>
+              </a:rPr>
+              <a:t>Eecke</a:t>
+            </a:r>
+            <a:r>
+              <a:rPr lang="nl-BE" sz="1200" dirty="0">
+                <a:solidFill>
+                  <a:srgbClr val="1D8DB0"/>
+                </a:solidFill>
+              </a:rPr>
+              <a:t> &amp; R. Vrielynck</a:t>
+            </a:r>
+          </a:p>
+        </p:txBody>
+      </p:sp>
+      <p:sp>
+        <p:nvSpPr>
+          <p:cNvPr id="11" name="Tekstvak 10">
             <a:extLst>
               <a:ext uri="{FF2B5EF4-FFF2-40B4-BE49-F238E27FC236}">
-                <a16:creationId xmlns:a16="http://schemas.microsoft.com/office/drawing/2014/main" id="{6DC5F5CE-E772-438D-AE6A-86414E0B072A}"/>
+                <a16:creationId xmlns:a16="http://schemas.microsoft.com/office/drawing/2014/main" id="{02C83A39-3DA1-4516-B834-3C3D5F8552F0}"/>
               </a:ext>
             </a:extLst>
           </p:cNvPr>
-          <p:cNvSpPr>
-            <a:spLocks noGrp="1"/>
-          </p:cNvSpPr>
-          <p:nvPr>
-            <p:ph type="sldNum" sz="quarter" idx="12"/>
-          </p:nvPr>
-        </p:nvSpPr>
-        <p:spPr/>
-        <p:txBody>
-          <a:bodyPr/>
-          <a:lstStyle/>
-          <a:p>
-            <a:fld id="{0A297500-7527-634B-90F4-69D0994C32B4}" type="slidenum">
-              <a:rPr lang="nl-NL" smtClean="0"/>
-              <a:t>14</a:t>
-            </a:fld>
-            <a:endParaRPr lang="nl-NL"/>
-          </a:p>
-        </p:txBody>
-      </p:sp>
-      <p:sp>
-        <p:nvSpPr>
-          <p:cNvPr id="5" name="Titel 4">
-            <a:extLst>
-              <a:ext uri="{FF2B5EF4-FFF2-40B4-BE49-F238E27FC236}">
-                <a16:creationId xmlns:a16="http://schemas.microsoft.com/office/drawing/2014/main" id="{ABD654FC-0EF3-41CA-AC73-0A81742D970C}"/>
-              </a:ext>
-            </a:extLst>
-          </p:cNvPr>
-          <p:cNvSpPr>
-            <a:spLocks noGrp="1"/>
-          </p:cNvSpPr>
-          <p:nvPr>
-            <p:ph type="title"/>
-          </p:nvPr>
-        </p:nvSpPr>
-        <p:spPr/>
-        <p:txBody>
-          <a:bodyPr/>
-          <a:lstStyle/>
-          <a:p>
-            <a:r>
-              <a:rPr lang="nl-NL" dirty="0" err="1">
-                <a:latin typeface="Arial"/>
-                <a:cs typeface="Arial"/>
-              </a:rPr>
-              <a:t>Concentration</a:t>
-            </a:r>
-            <a:r>
-              <a:rPr lang="nl-NL" dirty="0">
-                <a:latin typeface="Arial"/>
-                <a:cs typeface="Arial"/>
-              </a:rPr>
-              <a:t> </a:t>
-            </a:r>
-            <a:r>
-              <a:rPr lang="nl-NL" dirty="0" err="1">
-                <a:latin typeface="Arial"/>
-                <a:cs typeface="Arial"/>
-              </a:rPr>
-              <a:t>dependence</a:t>
-            </a:r>
-            <a:endParaRPr lang="nl-NL" dirty="0" err="1"/>
+          <p:cNvSpPr txBox="1"/>
+          <p:nvPr/>
+        </p:nvSpPr>
+        <p:spPr>
+          <a:xfrm>
+            <a:off x="576000" y="6356412"/>
+            <a:ext cx="10351364" cy="315471"/>
+          </a:xfrm>
+          <a:prstGeom prst="rect">
+            <a:avLst/>
+          </a:prstGeom>
+          <a:noFill/>
+        </p:spPr>
+        <p:txBody>
+          <a:bodyPr wrap="square" rtlCol="0">
+            <a:spAutoFit/>
+          </a:bodyPr>
+          <a:lstStyle/>
+          <a:p>
+            <a:r>
+              <a:rPr lang="nl-BE" sz="1450" dirty="0" err="1">
+                <a:solidFill>
+                  <a:schemeClr val="bg1"/>
+                </a:solidFill>
+              </a:rPr>
+              <a:t>Introduction</a:t>
+            </a:r>
+            <a:r>
+              <a:rPr lang="nl-BE" sz="1450" dirty="0">
+                <a:solidFill>
+                  <a:schemeClr val="bg1"/>
+                </a:solidFill>
+              </a:rPr>
+              <a:t>	</a:t>
+            </a:r>
+            <a:r>
+              <a:rPr lang="nl-BE" sz="1450" b="1" dirty="0">
+                <a:solidFill>
+                  <a:schemeClr val="bg1"/>
+                </a:solidFill>
+              </a:rPr>
+              <a:t>	Framework</a:t>
+            </a:r>
+            <a:r>
+              <a:rPr lang="nl-BE" sz="1450" dirty="0">
+                <a:solidFill>
+                  <a:schemeClr val="bg1"/>
+                </a:solidFill>
+              </a:rPr>
+              <a:t>		</a:t>
+            </a:r>
+            <a:r>
+              <a:rPr lang="nl-BE" sz="1450" dirty="0" err="1">
+                <a:solidFill>
+                  <a:schemeClr val="bg1"/>
+                </a:solidFill>
+              </a:rPr>
+              <a:t>Techniques</a:t>
+            </a:r>
+            <a:r>
+              <a:rPr lang="nl-BE" sz="1450" dirty="0">
+                <a:solidFill>
+                  <a:schemeClr val="bg1"/>
+                </a:solidFill>
+              </a:rPr>
+              <a:t> &amp; </a:t>
+            </a:r>
+            <a:r>
+              <a:rPr lang="nl-BE" sz="1450" dirty="0" err="1">
+                <a:solidFill>
+                  <a:schemeClr val="bg1"/>
+                </a:solidFill>
+              </a:rPr>
+              <a:t>Results</a:t>
+            </a:r>
+            <a:r>
+              <a:rPr lang="nl-BE" sz="1450" dirty="0">
+                <a:solidFill>
+                  <a:schemeClr val="bg1"/>
+                </a:solidFill>
+              </a:rPr>
+              <a:t>			Summary</a:t>
+            </a:r>
           </a:p>
         </p:txBody>
       </p:sp>
     </p:spTree>
     <p:extLst>
       <p:ext uri="{BB962C8B-B14F-4D97-AF65-F5344CB8AC3E}">
-        <p14:creationId xmlns:p14="http://schemas.microsoft.com/office/powerpoint/2010/main" val="623244575"/>
+        <p14:creationId xmlns:p14="http://schemas.microsoft.com/office/powerpoint/2010/main" val="4204038074"/>
       </p:ext>
     </p:extLst>
   </p:cSld>
@@ -9073,6 +9153,411 @@
           <p:cNvPr id="2" name="Tijdelijke aanduiding voor inhoud 1">
             <a:extLst>
               <a:ext uri="{FF2B5EF4-FFF2-40B4-BE49-F238E27FC236}">
+                <a16:creationId xmlns:a16="http://schemas.microsoft.com/office/drawing/2014/main" id="{DA23FDA8-8B91-4851-BFB1-DD9B789576B1}"/>
+              </a:ext>
+            </a:extLst>
+          </p:cNvPr>
+          <p:cNvSpPr>
+            <a:spLocks noGrp="1"/>
+          </p:cNvSpPr>
+          <p:nvPr>
+            <p:ph idx="1"/>
+          </p:nvPr>
+        </p:nvSpPr>
+        <p:spPr/>
+        <p:txBody>
+          <a:bodyPr vert="horz" lIns="91440" tIns="45720" rIns="91440" bIns="45720" rtlCol="0" anchor="t">
+            <a:normAutofit/>
+          </a:bodyPr>
+          <a:lstStyle/>
+          <a:p>
+            <a:r>
+              <a:rPr lang="nl-NL" dirty="0">
+                <a:latin typeface="Arial"/>
+                <a:cs typeface="Arial"/>
+              </a:rPr>
+              <a:t>Large </a:t>
+            </a:r>
+            <a:r>
+              <a:rPr lang="nl-NL" dirty="0" err="1">
+                <a:latin typeface="Arial"/>
+                <a:cs typeface="Arial"/>
+              </a:rPr>
+              <a:t>concentration</a:t>
+            </a:r>
+            <a:r>
+              <a:rPr lang="nl-NL" dirty="0">
+                <a:latin typeface="Arial"/>
+                <a:cs typeface="Arial"/>
+              </a:rPr>
+              <a:t> --&gt; </a:t>
+            </a:r>
+            <a:r>
+              <a:rPr lang="nl-NL" dirty="0" err="1">
+                <a:latin typeface="Arial"/>
+                <a:cs typeface="Arial"/>
+              </a:rPr>
+              <a:t>aggregation</a:t>
+            </a:r>
+            <a:r>
+              <a:rPr lang="nl-NL" dirty="0">
+                <a:latin typeface="Arial"/>
+                <a:cs typeface="Arial"/>
+              </a:rPr>
+              <a:t> of </a:t>
+            </a:r>
+            <a:r>
+              <a:rPr lang="nl-NL" dirty="0" err="1">
+                <a:latin typeface="Arial"/>
+                <a:cs typeface="Arial"/>
+              </a:rPr>
+              <a:t>particles</a:t>
+            </a:r>
+          </a:p>
+          <a:p>
+            <a:r>
+              <a:rPr lang="nl-NL" dirty="0" err="1">
+                <a:latin typeface="Arial"/>
+                <a:cs typeface="Arial"/>
+              </a:rPr>
+              <a:t>Larger</a:t>
+            </a:r>
+            <a:r>
+              <a:rPr lang="nl-NL" dirty="0">
+                <a:latin typeface="Arial"/>
+                <a:cs typeface="Arial"/>
+              </a:rPr>
+              <a:t> </a:t>
+            </a:r>
+            <a:r>
+              <a:rPr lang="nl-NL" dirty="0" err="1">
+                <a:latin typeface="Arial"/>
+                <a:cs typeface="Arial"/>
+              </a:rPr>
+              <a:t>particles</a:t>
+            </a:r>
+            <a:r>
+              <a:rPr lang="nl-NL" dirty="0">
+                <a:latin typeface="Arial"/>
+                <a:cs typeface="Arial"/>
+              </a:rPr>
+              <a:t>, </a:t>
+            </a:r>
+            <a:r>
+              <a:rPr lang="nl-NL" dirty="0" err="1">
+                <a:latin typeface="Arial"/>
+                <a:cs typeface="Arial"/>
+              </a:rPr>
+              <a:t>less</a:t>
+            </a:r>
+            <a:r>
+              <a:rPr lang="nl-NL" dirty="0">
+                <a:latin typeface="Arial"/>
+                <a:cs typeface="Arial"/>
+              </a:rPr>
+              <a:t> </a:t>
+            </a:r>
+            <a:r>
+              <a:rPr lang="nl-NL" dirty="0" err="1">
+                <a:latin typeface="Arial"/>
+                <a:cs typeface="Arial"/>
+              </a:rPr>
+              <a:t>surface</a:t>
+            </a:r>
+            <a:r>
+              <a:rPr lang="nl-NL" dirty="0">
+                <a:latin typeface="Arial"/>
+                <a:cs typeface="Arial"/>
+              </a:rPr>
+              <a:t> AND </a:t>
+            </a:r>
+            <a:r>
+              <a:rPr lang="nl-NL" dirty="0" err="1">
+                <a:latin typeface="Arial"/>
+                <a:cs typeface="Arial"/>
+              </a:rPr>
+              <a:t>white</a:t>
+            </a:r>
+            <a:r>
+              <a:rPr lang="nl-NL" dirty="0">
+                <a:latin typeface="Arial"/>
+                <a:cs typeface="Arial"/>
+              </a:rPr>
+              <a:t> </a:t>
+            </a:r>
+            <a:r>
+              <a:rPr lang="nl-NL" dirty="0" err="1">
+                <a:latin typeface="Arial"/>
+                <a:cs typeface="Arial"/>
+              </a:rPr>
+              <a:t>bloodcells</a:t>
+            </a:r>
+            <a:r>
+              <a:rPr lang="nl-NL" dirty="0">
+                <a:latin typeface="Arial"/>
+                <a:cs typeface="Arial"/>
+              </a:rPr>
+              <a:t> </a:t>
+            </a:r>
+            <a:r>
+              <a:rPr lang="nl-NL" dirty="0" err="1">
+                <a:latin typeface="Arial"/>
+                <a:cs typeface="Arial"/>
+              </a:rPr>
+              <a:t>can</a:t>
+            </a:r>
+            <a:r>
+              <a:rPr lang="nl-NL" dirty="0">
+                <a:latin typeface="Arial"/>
+                <a:cs typeface="Arial"/>
+              </a:rPr>
+              <a:t> </a:t>
+            </a:r>
+            <a:r>
+              <a:rPr lang="nl-NL" dirty="0" err="1">
+                <a:latin typeface="Arial"/>
+                <a:cs typeface="Arial"/>
+              </a:rPr>
+              <a:t>macrophage</a:t>
+            </a:r>
+            <a:r>
+              <a:rPr lang="nl-NL" dirty="0">
+                <a:latin typeface="Arial"/>
+                <a:cs typeface="Arial"/>
+              </a:rPr>
+              <a:t> </a:t>
+            </a:r>
+            <a:r>
+              <a:rPr lang="nl-NL" dirty="0" err="1">
+                <a:latin typeface="Arial"/>
+                <a:cs typeface="Arial"/>
+              </a:rPr>
+              <a:t>the</a:t>
+            </a:r>
+            <a:r>
+              <a:rPr lang="nl-NL" dirty="0">
+                <a:latin typeface="Arial"/>
+                <a:cs typeface="Arial"/>
+              </a:rPr>
+              <a:t> </a:t>
+            </a:r>
+            <a:r>
+              <a:rPr lang="nl-NL" dirty="0" err="1">
+                <a:latin typeface="Arial"/>
+                <a:cs typeface="Arial"/>
+              </a:rPr>
+              <a:t>aggregates</a:t>
+            </a:r>
+            <a:endParaRPr lang="nl-NL" dirty="0" err="1">
+              <a:cs typeface="Arial"/>
+            </a:endParaRPr>
+          </a:p>
+          <a:p>
+            <a:r>
+              <a:rPr lang="nl-NL" dirty="0">
+                <a:latin typeface="Arial"/>
+                <a:cs typeface="Arial"/>
+              </a:rPr>
+              <a:t>Large </a:t>
+            </a:r>
+            <a:r>
+              <a:rPr lang="nl-NL" dirty="0" err="1">
+                <a:latin typeface="Arial"/>
+                <a:cs typeface="Arial"/>
+              </a:rPr>
+              <a:t>concentration</a:t>
+            </a:r>
+            <a:r>
+              <a:rPr lang="nl-NL" dirty="0">
+                <a:latin typeface="Arial"/>
+                <a:cs typeface="Arial"/>
+              </a:rPr>
+              <a:t> </a:t>
+            </a:r>
+            <a:r>
+              <a:rPr lang="nl-NL" dirty="0" err="1">
+                <a:latin typeface="Arial"/>
+                <a:cs typeface="Arial"/>
+              </a:rPr>
+              <a:t>results</a:t>
+            </a:r>
+            <a:r>
+              <a:rPr lang="nl-NL" dirty="0">
+                <a:latin typeface="Arial"/>
+                <a:cs typeface="Arial"/>
+              </a:rPr>
+              <a:t> in </a:t>
+            </a:r>
+            <a:r>
+              <a:rPr lang="nl-NL" dirty="0" err="1">
+                <a:latin typeface="Arial"/>
+                <a:cs typeface="Arial"/>
+              </a:rPr>
+              <a:t>less</a:t>
+            </a:r>
+            <a:r>
+              <a:rPr lang="nl-NL" dirty="0">
+                <a:latin typeface="Arial"/>
+                <a:cs typeface="Arial"/>
+              </a:rPr>
+              <a:t> </a:t>
+            </a:r>
+            <a:r>
+              <a:rPr lang="nl-NL" dirty="0" err="1">
+                <a:latin typeface="Arial"/>
+                <a:cs typeface="Arial"/>
+              </a:rPr>
+              <a:t>toxicity</a:t>
+            </a:r>
+            <a:endParaRPr lang="nl-NL" dirty="0" err="1">
+              <a:cs typeface="Arial"/>
+            </a:endParaRPr>
+          </a:p>
+          <a:p>
+            <a:endParaRPr lang="nl-NL" dirty="0">
+              <a:cs typeface="Arial"/>
+            </a:endParaRPr>
+          </a:p>
+        </p:txBody>
+      </p:sp>
+      <p:sp>
+        <p:nvSpPr>
+          <p:cNvPr id="3" name="Tijdelijke aanduiding voor voettekst 2">
+            <a:extLst>
+              <a:ext uri="{FF2B5EF4-FFF2-40B4-BE49-F238E27FC236}">
+                <a16:creationId xmlns:a16="http://schemas.microsoft.com/office/drawing/2014/main" id="{34BF4704-138D-49F1-B37A-017E77BC0845}"/>
+              </a:ext>
+            </a:extLst>
+          </p:cNvPr>
+          <p:cNvSpPr>
+            <a:spLocks noGrp="1"/>
+          </p:cNvSpPr>
+          <p:nvPr>
+            <p:ph type="ftr" sz="quarter" idx="11"/>
+          </p:nvPr>
+        </p:nvSpPr>
+        <p:spPr/>
+        <p:txBody>
+          <a:bodyPr/>
+          <a:lstStyle/>
+          <a:p>
+            <a:r>
+              <a:rPr lang="nl-NL"/>
+              <a:t>Faculteit, departement, dienst …</a:t>
+            </a:r>
+          </a:p>
+        </p:txBody>
+      </p:sp>
+      <p:sp>
+        <p:nvSpPr>
+          <p:cNvPr id="4" name="Tijdelijke aanduiding voor dianummer 3">
+            <a:extLst>
+              <a:ext uri="{FF2B5EF4-FFF2-40B4-BE49-F238E27FC236}">
+                <a16:creationId xmlns:a16="http://schemas.microsoft.com/office/drawing/2014/main" id="{6DC5F5CE-E772-438D-AE6A-86414E0B072A}"/>
+              </a:ext>
+            </a:extLst>
+          </p:cNvPr>
+          <p:cNvSpPr>
+            <a:spLocks noGrp="1"/>
+          </p:cNvSpPr>
+          <p:nvPr>
+            <p:ph type="sldNum" sz="quarter" idx="12"/>
+          </p:nvPr>
+        </p:nvSpPr>
+        <p:spPr/>
+        <p:txBody>
+          <a:bodyPr/>
+          <a:lstStyle/>
+          <a:p>
+            <a:fld id="{0A297500-7527-634B-90F4-69D0994C32B4}" type="slidenum">
+              <a:rPr lang="nl-NL" smtClean="0"/>
+              <a:t>15</a:t>
+            </a:fld>
+            <a:endParaRPr lang="nl-NL"/>
+          </a:p>
+        </p:txBody>
+      </p:sp>
+      <p:sp>
+        <p:nvSpPr>
+          <p:cNvPr id="5" name="Titel 4">
+            <a:extLst>
+              <a:ext uri="{FF2B5EF4-FFF2-40B4-BE49-F238E27FC236}">
+                <a16:creationId xmlns:a16="http://schemas.microsoft.com/office/drawing/2014/main" id="{ABD654FC-0EF3-41CA-AC73-0A81742D970C}"/>
+              </a:ext>
+            </a:extLst>
+          </p:cNvPr>
+          <p:cNvSpPr>
+            <a:spLocks noGrp="1"/>
+          </p:cNvSpPr>
+          <p:nvPr>
+            <p:ph type="title"/>
+          </p:nvPr>
+        </p:nvSpPr>
+        <p:spPr/>
+        <p:txBody>
+          <a:bodyPr/>
+          <a:lstStyle/>
+          <a:p>
+            <a:r>
+              <a:rPr lang="nl-NL" dirty="0" err="1">
+                <a:latin typeface="Arial"/>
+                <a:cs typeface="Arial"/>
+              </a:rPr>
+              <a:t>Concentration</a:t>
+            </a:r>
+            <a:r>
+              <a:rPr lang="nl-NL" dirty="0">
+                <a:latin typeface="Arial"/>
+                <a:cs typeface="Arial"/>
+              </a:rPr>
+              <a:t> </a:t>
+            </a:r>
+            <a:r>
+              <a:rPr lang="nl-NL" dirty="0" err="1">
+                <a:latin typeface="Arial"/>
+                <a:cs typeface="Arial"/>
+              </a:rPr>
+              <a:t>dependence</a:t>
+            </a:r>
+            <a:endParaRPr lang="nl-NL" dirty="0" err="1"/>
+          </a:p>
+        </p:txBody>
+      </p:sp>
+    </p:spTree>
+    <p:extLst>
+      <p:ext uri="{BB962C8B-B14F-4D97-AF65-F5344CB8AC3E}">
+        <p14:creationId xmlns:p14="http://schemas.microsoft.com/office/powerpoint/2010/main" val="623244575"/>
+      </p:ext>
+    </p:extLst>
+  </p:cSld>
+  <p:clrMapOvr>
+    <a:masterClrMapping/>
+  </p:clrMapOvr>
+</p:sld>
+</file>
+
+<file path=ppt/slides/slide16.xml><?xml version="1.0" encoding="utf-8"?>
+<p:sld xmlns:a="http://schemas.openxmlformats.org/drawingml/2006/main" xmlns:r="http://schemas.openxmlformats.org/officeDocument/2006/relationships" xmlns:p="http://schemas.openxmlformats.org/presentationml/2006/main">
+  <p:cSld>
+    <p:spTree>
+      <p:nvGrpSpPr>
+        <p:cNvPr id="1" name=""/>
+        <p:cNvGrpSpPr/>
+        <p:nvPr/>
+      </p:nvGrpSpPr>
+      <p:grpSpPr>
+        <a:xfrm>
+          <a:off x="0" y="0"/>
+          <a:ext cx="0" cy="0"/>
+          <a:chOff x="0" y="0"/>
+          <a:chExt cx="0" cy="0"/>
+        </a:xfrm>
+      </p:grpSpPr>
+      <p:sp>
+        <p:nvSpPr>
+          <p:cNvPr id="2" name="Tijdelijke aanduiding voor inhoud 1">
+            <a:extLst>
+              <a:ext uri="{FF2B5EF4-FFF2-40B4-BE49-F238E27FC236}">
                 <a16:creationId xmlns:a16="http://schemas.microsoft.com/office/drawing/2014/main" id="{BFCDAFE0-D654-42D9-8D30-FE908B3DD1D8}"/>
               </a:ext>
             </a:extLst>
@@ -9212,7 +9697,7 @@
           <a:p>
             <a:fld id="{0A297500-7527-634B-90F4-69D0994C32B4}" type="slidenum">
               <a:rPr lang="nl-NL" smtClean="0"/>
-              <a:t>15</a:t>
+              <a:t>16</a:t>
             </a:fld>
             <a:endParaRPr lang="nl-NL"/>
           </a:p>
@@ -9307,326 +9792,6 @@
 </p:sld>
 </file>
 
-<file path=ppt/slides/slide16.xml><?xml version="1.0" encoding="utf-8"?>
-<p:sld xmlns:a="http://schemas.openxmlformats.org/drawingml/2006/main" xmlns:r="http://schemas.openxmlformats.org/officeDocument/2006/relationships" xmlns:p="http://schemas.openxmlformats.org/presentationml/2006/main">
-  <p:cSld>
-    <p:spTree>
-      <p:nvGrpSpPr>
-        <p:cNvPr id="1" name=""/>
-        <p:cNvGrpSpPr/>
-        <p:nvPr/>
-      </p:nvGrpSpPr>
-      <p:grpSpPr>
-        <a:xfrm>
-          <a:off x="0" y="0"/>
-          <a:ext cx="0" cy="0"/>
-          <a:chOff x="0" y="0"/>
-          <a:chExt cx="0" cy="0"/>
-        </a:xfrm>
-      </p:grpSpPr>
-      <p:sp>
-        <p:nvSpPr>
-          <p:cNvPr id="2" name="Tijdelijke aanduiding voor inhoud 1">
-            <a:extLst>
-              <a:ext uri="{FF2B5EF4-FFF2-40B4-BE49-F238E27FC236}">
-                <a16:creationId xmlns:a16="http://schemas.microsoft.com/office/drawing/2014/main" id="{ECD9C7FC-FC06-4374-A1C7-C9C35F1BE892}"/>
-              </a:ext>
-            </a:extLst>
-          </p:cNvPr>
-          <p:cNvSpPr>
-            <a:spLocks noGrp="1"/>
-          </p:cNvSpPr>
-          <p:nvPr>
-            <p:ph idx="1"/>
-          </p:nvPr>
-        </p:nvSpPr>
-        <p:spPr/>
-        <p:txBody>
-          <a:bodyPr vert="horz" lIns="91440" tIns="45720" rIns="91440" bIns="45720" rtlCol="0" anchor="t">
-            <a:normAutofit/>
-          </a:bodyPr>
-          <a:lstStyle/>
-          <a:p>
-            <a:r>
-              <a:rPr lang="nl-NL" dirty="0">
-                <a:latin typeface="Arial"/>
-                <a:cs typeface="Arial"/>
-              </a:rPr>
-              <a:t>Long fibers are more </a:t>
-            </a:r>
-            <a:r>
-              <a:rPr lang="nl-NL" dirty="0" err="1">
-                <a:latin typeface="Arial"/>
-                <a:cs typeface="Arial"/>
-              </a:rPr>
-              <a:t>toxic</a:t>
-            </a:r>
-            <a:r>
-              <a:rPr lang="nl-NL" dirty="0">
-                <a:latin typeface="Arial"/>
-                <a:cs typeface="Arial"/>
-              </a:rPr>
-              <a:t> </a:t>
-            </a:r>
-            <a:r>
-              <a:rPr lang="nl-NL" dirty="0" err="1">
-                <a:latin typeface="Arial"/>
-                <a:cs typeface="Arial"/>
-              </a:rPr>
-              <a:t>than</a:t>
-            </a:r>
-            <a:r>
-              <a:rPr lang="nl-NL" dirty="0">
-                <a:latin typeface="Arial"/>
-                <a:cs typeface="Arial"/>
-              </a:rPr>
-              <a:t> short </a:t>
-            </a:r>
-            <a:r>
-              <a:rPr lang="nl-NL" dirty="0" err="1">
-                <a:latin typeface="Arial"/>
-                <a:cs typeface="Arial"/>
-              </a:rPr>
-              <a:t>ones</a:t>
-            </a:r>
-            <a:endParaRPr lang="nl-NL" dirty="0" err="1">
-              <a:cs typeface="Arial" charset="0"/>
-            </a:endParaRPr>
-          </a:p>
-          <a:p>
-            <a:r>
-              <a:rPr lang="nl-NL" dirty="0" err="1">
-                <a:latin typeface="Arial"/>
-                <a:cs typeface="Arial"/>
-              </a:rPr>
-              <a:t>Stay</a:t>
-            </a:r>
-            <a:r>
-              <a:rPr lang="nl-NL" dirty="0">
-                <a:latin typeface="Arial"/>
-                <a:cs typeface="Arial"/>
-              </a:rPr>
-              <a:t> </a:t>
-            </a:r>
-            <a:r>
-              <a:rPr lang="nl-NL" dirty="0" err="1">
-                <a:latin typeface="Arial"/>
-                <a:cs typeface="Arial"/>
-              </a:rPr>
-              <a:t>longer</a:t>
-            </a:r>
-            <a:r>
-              <a:rPr lang="nl-NL" dirty="0">
-                <a:latin typeface="Arial"/>
-                <a:cs typeface="Arial"/>
-              </a:rPr>
-              <a:t> in </a:t>
-            </a:r>
-            <a:r>
-              <a:rPr lang="nl-NL" dirty="0" err="1">
-                <a:latin typeface="Arial"/>
-                <a:cs typeface="Arial"/>
-              </a:rPr>
-              <a:t>the</a:t>
-            </a:r>
-            <a:r>
-              <a:rPr lang="nl-NL" dirty="0">
-                <a:latin typeface="Arial"/>
-                <a:cs typeface="Arial"/>
-              </a:rPr>
-              <a:t> body (81% </a:t>
-            </a:r>
-            <a:r>
-              <a:rPr lang="nl-NL" dirty="0" err="1">
-                <a:latin typeface="Arial"/>
-                <a:cs typeface="Arial"/>
-              </a:rPr>
-              <a:t>after</a:t>
-            </a:r>
-            <a:r>
-              <a:rPr lang="nl-NL" dirty="0">
-                <a:latin typeface="Arial"/>
-                <a:cs typeface="Arial"/>
-              </a:rPr>
-              <a:t> 60 </a:t>
-            </a:r>
-            <a:r>
-              <a:rPr lang="nl-NL" dirty="0" err="1">
-                <a:latin typeface="Arial"/>
-                <a:cs typeface="Arial"/>
-              </a:rPr>
-              <a:t>days</a:t>
-            </a:r>
-            <a:r>
-              <a:rPr lang="nl-NL" dirty="0">
-                <a:latin typeface="Arial"/>
-                <a:cs typeface="Arial"/>
-              </a:rPr>
-              <a:t>)</a:t>
-            </a:r>
-          </a:p>
-          <a:p>
-            <a:r>
-              <a:rPr lang="nl-NL" dirty="0">
-                <a:latin typeface="Arial"/>
-                <a:cs typeface="Arial"/>
-              </a:rPr>
-              <a:t>Carbon nanotubes </a:t>
-            </a:r>
-            <a:r>
-              <a:rPr lang="nl-NL" dirty="0" err="1">
-                <a:latin typeface="Arial"/>
-                <a:cs typeface="Arial"/>
-              </a:rPr>
-              <a:t>can</a:t>
-            </a:r>
-            <a:r>
-              <a:rPr lang="nl-NL" dirty="0">
-                <a:latin typeface="Arial"/>
-                <a:cs typeface="Arial"/>
-              </a:rPr>
-              <a:t> </a:t>
-            </a:r>
-            <a:r>
-              <a:rPr lang="nl-NL" dirty="0" err="1">
-                <a:latin typeface="Arial"/>
-                <a:cs typeface="Arial"/>
-              </a:rPr>
-              <a:t>be</a:t>
-            </a:r>
-            <a:r>
-              <a:rPr lang="nl-NL" dirty="0">
-                <a:latin typeface="Arial"/>
-                <a:cs typeface="Arial"/>
-              </a:rPr>
-              <a:t> </a:t>
-            </a:r>
-            <a:r>
-              <a:rPr lang="nl-NL" dirty="0" err="1">
-                <a:latin typeface="Arial"/>
-                <a:cs typeface="Arial"/>
-              </a:rPr>
-              <a:t>very</a:t>
-            </a:r>
-            <a:r>
-              <a:rPr lang="nl-NL" dirty="0">
-                <a:latin typeface="Arial"/>
-                <a:cs typeface="Arial"/>
-              </a:rPr>
-              <a:t> </a:t>
-            </a:r>
-            <a:r>
-              <a:rPr lang="nl-NL" dirty="0" err="1">
-                <a:latin typeface="Arial"/>
-                <a:cs typeface="Arial"/>
-              </a:rPr>
-              <a:t>toxic</a:t>
-            </a:r>
-          </a:p>
-        </p:txBody>
-      </p:sp>
-      <p:sp>
-        <p:nvSpPr>
-          <p:cNvPr id="3" name="Tijdelijke aanduiding voor voettekst 2">
-            <a:extLst>
-              <a:ext uri="{FF2B5EF4-FFF2-40B4-BE49-F238E27FC236}">
-                <a16:creationId xmlns:a16="http://schemas.microsoft.com/office/drawing/2014/main" id="{3D0B3870-0B8D-4CA7-860A-9D56EB7AC438}"/>
-              </a:ext>
-            </a:extLst>
-          </p:cNvPr>
-          <p:cNvSpPr>
-            <a:spLocks noGrp="1"/>
-          </p:cNvSpPr>
-          <p:nvPr>
-            <p:ph type="ftr" sz="quarter" idx="11"/>
-          </p:nvPr>
-        </p:nvSpPr>
-        <p:spPr/>
-        <p:txBody>
-          <a:bodyPr/>
-          <a:lstStyle/>
-          <a:p>
-            <a:r>
-              <a:rPr lang="nl-NL"/>
-              <a:t>Faculteit, departement, dienst …</a:t>
-            </a:r>
-          </a:p>
-        </p:txBody>
-      </p:sp>
-      <p:sp>
-        <p:nvSpPr>
-          <p:cNvPr id="4" name="Tijdelijke aanduiding voor dianummer 3">
-            <a:extLst>
-              <a:ext uri="{FF2B5EF4-FFF2-40B4-BE49-F238E27FC236}">
-                <a16:creationId xmlns:a16="http://schemas.microsoft.com/office/drawing/2014/main" id="{4950DF76-99D2-40CB-A88F-ECF57CE1760C}"/>
-              </a:ext>
-            </a:extLst>
-          </p:cNvPr>
-          <p:cNvSpPr>
-            <a:spLocks noGrp="1"/>
-          </p:cNvSpPr>
-          <p:nvPr>
-            <p:ph type="sldNum" sz="quarter" idx="12"/>
-          </p:nvPr>
-        </p:nvSpPr>
-        <p:spPr/>
-        <p:txBody>
-          <a:bodyPr/>
-          <a:lstStyle/>
-          <a:p>
-            <a:fld id="{0A297500-7527-634B-90F4-69D0994C32B4}" type="slidenum">
-              <a:rPr lang="nl-NL" smtClean="0"/>
-              <a:t>16</a:t>
-            </a:fld>
-            <a:endParaRPr lang="nl-NL"/>
-          </a:p>
-        </p:txBody>
-      </p:sp>
-      <p:sp>
-        <p:nvSpPr>
-          <p:cNvPr id="5" name="Titel 4">
-            <a:extLst>
-              <a:ext uri="{FF2B5EF4-FFF2-40B4-BE49-F238E27FC236}">
-                <a16:creationId xmlns:a16="http://schemas.microsoft.com/office/drawing/2014/main" id="{89B92165-5C9D-4BF0-92C6-267065DC29DC}"/>
-              </a:ext>
-            </a:extLst>
-          </p:cNvPr>
-          <p:cNvSpPr>
-            <a:spLocks noGrp="1"/>
-          </p:cNvSpPr>
-          <p:nvPr>
-            <p:ph type="title"/>
-          </p:nvPr>
-        </p:nvSpPr>
-        <p:spPr/>
-        <p:txBody>
-          <a:bodyPr/>
-          <a:lstStyle/>
-          <a:p>
-            <a:r>
-              <a:rPr lang="nl-NL" dirty="0">
-                <a:latin typeface="Arial"/>
-                <a:cs typeface="Arial"/>
-              </a:rPr>
-              <a:t>Aspect ratio</a:t>
-            </a:r>
-            <a:endParaRPr lang="nl-NL" dirty="0"/>
-          </a:p>
-        </p:txBody>
-      </p:sp>
-    </p:spTree>
-    <p:extLst>
-      <p:ext uri="{BB962C8B-B14F-4D97-AF65-F5344CB8AC3E}">
-        <p14:creationId xmlns:p14="http://schemas.microsoft.com/office/powerpoint/2010/main" val="4263617995"/>
-      </p:ext>
-    </p:extLst>
-  </p:cSld>
-  <p:clrMapOvr>
-    <a:masterClrMapping/>
-  </p:clrMapOvr>
-</p:sld>
-</file>
-
 <file path=ppt/slides/slide17.xml><?xml version="1.0" encoding="utf-8"?>
 <p:sld xmlns:a="http://schemas.openxmlformats.org/drawingml/2006/main" xmlns:r="http://schemas.openxmlformats.org/officeDocument/2006/relationships" xmlns:p="http://schemas.openxmlformats.org/presentationml/2006/main">
   <p:cSld>
@@ -9649,7 +9814,7 @@
           <p:cNvPr id="2" name="Tijdelijke aanduiding voor inhoud 1">
             <a:extLst>
               <a:ext uri="{FF2B5EF4-FFF2-40B4-BE49-F238E27FC236}">
-                <a16:creationId xmlns:a16="http://schemas.microsoft.com/office/drawing/2014/main" id="{1D154430-BEF3-4E06-8F0F-0103FC5AE3D5}"/>
+                <a16:creationId xmlns:a16="http://schemas.microsoft.com/office/drawing/2014/main" id="{ECD9C7FC-FC06-4374-A1C7-C9C35F1BE892}"/>
               </a:ext>
             </a:extLst>
           </p:cNvPr>
@@ -9667,9 +9832,181 @@
           </a:bodyPr>
           <a:lstStyle/>
           <a:p>
-            <a:endParaRPr lang="nl-NL" dirty="0">
-              <a:cs typeface="Arial"/>
+            <a:r>
+              <a:rPr lang="nl-NL" dirty="0">
+                <a:latin typeface="Arial"/>
+                <a:cs typeface="Arial"/>
+              </a:rPr>
+              <a:t>Long fibers are more </a:t>
+            </a:r>
+            <a:r>
+              <a:rPr lang="nl-NL" dirty="0" err="1">
+                <a:latin typeface="Arial"/>
+                <a:cs typeface="Arial"/>
+              </a:rPr>
+              <a:t>toxic</a:t>
+            </a:r>
+            <a:r>
+              <a:rPr lang="nl-NL" dirty="0">
+                <a:latin typeface="Arial"/>
+                <a:cs typeface="Arial"/>
+              </a:rPr>
+              <a:t> </a:t>
+            </a:r>
+            <a:r>
+              <a:rPr lang="nl-NL" dirty="0" err="1">
+                <a:latin typeface="Arial"/>
+                <a:cs typeface="Arial"/>
+              </a:rPr>
+              <a:t>than</a:t>
+            </a:r>
+            <a:r>
+              <a:rPr lang="nl-NL" dirty="0">
+                <a:latin typeface="Arial"/>
+                <a:cs typeface="Arial"/>
+              </a:rPr>
+              <a:t> short </a:t>
+            </a:r>
+            <a:r>
+              <a:rPr lang="nl-NL" dirty="0" err="1">
+                <a:latin typeface="Arial"/>
+                <a:cs typeface="Arial"/>
+              </a:rPr>
+              <a:t>ones</a:t>
+            </a:r>
+            <a:endParaRPr lang="nl-NL" dirty="0" err="1">
+              <a:cs typeface="Arial" charset="0"/>
             </a:endParaRPr>
+          </a:p>
+          <a:p>
+            <a:r>
+              <a:rPr lang="nl-NL" dirty="0" err="1">
+                <a:latin typeface="Arial"/>
+                <a:cs typeface="Arial"/>
+              </a:rPr>
+              <a:t>Stay</a:t>
+            </a:r>
+            <a:r>
+              <a:rPr lang="nl-NL" dirty="0">
+                <a:latin typeface="Arial"/>
+                <a:cs typeface="Arial"/>
+              </a:rPr>
+              <a:t> </a:t>
+            </a:r>
+            <a:r>
+              <a:rPr lang="nl-NL" dirty="0" err="1">
+                <a:latin typeface="Arial"/>
+                <a:cs typeface="Arial"/>
+              </a:rPr>
+              <a:t>longer</a:t>
+            </a:r>
+            <a:r>
+              <a:rPr lang="nl-NL" dirty="0">
+                <a:latin typeface="Arial"/>
+                <a:cs typeface="Arial"/>
+              </a:rPr>
+              <a:t> in </a:t>
+            </a:r>
+            <a:r>
+              <a:rPr lang="nl-NL" dirty="0" err="1">
+                <a:latin typeface="Arial"/>
+                <a:cs typeface="Arial"/>
+              </a:rPr>
+              <a:t>the</a:t>
+            </a:r>
+            <a:r>
+              <a:rPr lang="nl-NL" dirty="0">
+                <a:latin typeface="Arial"/>
+                <a:cs typeface="Arial"/>
+              </a:rPr>
+              <a:t> body (81% </a:t>
+            </a:r>
+            <a:r>
+              <a:rPr lang="nl-NL" dirty="0" err="1">
+                <a:latin typeface="Arial"/>
+                <a:cs typeface="Arial"/>
+              </a:rPr>
+              <a:t>after</a:t>
+            </a:r>
+            <a:r>
+              <a:rPr lang="nl-NL" dirty="0">
+                <a:latin typeface="Arial"/>
+                <a:cs typeface="Arial"/>
+              </a:rPr>
+              <a:t> 60 </a:t>
+            </a:r>
+            <a:r>
+              <a:rPr lang="nl-NL" dirty="0" err="1">
+                <a:latin typeface="Arial"/>
+                <a:cs typeface="Arial"/>
+              </a:rPr>
+              <a:t>days</a:t>
+            </a:r>
+            <a:r>
+              <a:rPr lang="nl-NL" dirty="0">
+                <a:latin typeface="Arial"/>
+                <a:cs typeface="Arial"/>
+              </a:rPr>
+              <a:t>)</a:t>
+            </a:r>
+          </a:p>
+          <a:p>
+            <a:r>
+              <a:rPr lang="nl-NL" dirty="0">
+                <a:latin typeface="Arial"/>
+                <a:cs typeface="Arial"/>
+              </a:rPr>
+              <a:t>Carbon nanotubes </a:t>
+            </a:r>
+            <a:r>
+              <a:rPr lang="nl-NL" dirty="0" err="1">
+                <a:latin typeface="Arial"/>
+                <a:cs typeface="Arial"/>
+              </a:rPr>
+              <a:t>can</a:t>
+            </a:r>
+            <a:r>
+              <a:rPr lang="nl-NL" dirty="0">
+                <a:latin typeface="Arial"/>
+                <a:cs typeface="Arial"/>
+              </a:rPr>
+              <a:t> </a:t>
+            </a:r>
+            <a:r>
+              <a:rPr lang="nl-NL" dirty="0" err="1">
+                <a:latin typeface="Arial"/>
+                <a:cs typeface="Arial"/>
+              </a:rPr>
+              <a:t>be</a:t>
+            </a:r>
+            <a:r>
+              <a:rPr lang="nl-NL" dirty="0">
+                <a:latin typeface="Arial"/>
+                <a:cs typeface="Arial"/>
+              </a:rPr>
+              <a:t> </a:t>
+            </a:r>
+            <a:r>
+              <a:rPr lang="nl-NL" dirty="0" err="1">
+                <a:latin typeface="Arial"/>
+                <a:cs typeface="Arial"/>
+              </a:rPr>
+              <a:t>very</a:t>
+            </a:r>
+            <a:r>
+              <a:rPr lang="nl-NL" dirty="0">
+                <a:latin typeface="Arial"/>
+                <a:cs typeface="Arial"/>
+              </a:rPr>
+              <a:t> </a:t>
+            </a:r>
+            <a:r>
+              <a:rPr lang="nl-NL" dirty="0" err="1">
+                <a:latin typeface="Arial"/>
+                <a:cs typeface="Arial"/>
+              </a:rPr>
+              <a:t>toxic</a:t>
+            </a:r>
           </a:p>
         </p:txBody>
       </p:sp>
@@ -9678,7 +10015,7 @@
           <p:cNvPr id="3" name="Tijdelijke aanduiding voor voettekst 2">
             <a:extLst>
               <a:ext uri="{FF2B5EF4-FFF2-40B4-BE49-F238E27FC236}">
-                <a16:creationId xmlns:a16="http://schemas.microsoft.com/office/drawing/2014/main" id="{D675B85F-3EDA-4A13-B39F-123D17144CAB}"/>
+                <a16:creationId xmlns:a16="http://schemas.microsoft.com/office/drawing/2014/main" id="{3D0B3870-0B8D-4CA7-860A-9D56EB7AC438}"/>
               </a:ext>
             </a:extLst>
           </p:cNvPr>
@@ -9706,7 +10043,7 @@
           <p:cNvPr id="4" name="Tijdelijke aanduiding voor dianummer 3">
             <a:extLst>
               <a:ext uri="{FF2B5EF4-FFF2-40B4-BE49-F238E27FC236}">
-                <a16:creationId xmlns:a16="http://schemas.microsoft.com/office/drawing/2014/main" id="{A36FD602-DA2B-4444-9055-A8FA61CA3158}"/>
+                <a16:creationId xmlns:a16="http://schemas.microsoft.com/office/drawing/2014/main" id="{4950DF76-99D2-40CB-A88F-ECF57CE1760C}"/>
               </a:ext>
             </a:extLst>
           </p:cNvPr>
@@ -9735,7 +10072,7 @@
           <p:cNvPr id="5" name="Titel 4">
             <a:extLst>
               <a:ext uri="{FF2B5EF4-FFF2-40B4-BE49-F238E27FC236}">
-                <a16:creationId xmlns:a16="http://schemas.microsoft.com/office/drawing/2014/main" id="{5FC96F9B-0EAB-4D46-8ACB-5E9AB3D673FD}"/>
+                <a16:creationId xmlns:a16="http://schemas.microsoft.com/office/drawing/2014/main" id="{89B92165-5C9D-4BF0-92C6-267065DC29DC}"/>
               </a:ext>
             </a:extLst>
           </p:cNvPr>
@@ -9756,23 +10093,16 @@
                 <a:latin typeface="Arial"/>
                 <a:cs typeface="Arial"/>
               </a:rPr>
-              <a:t>Carbon nanotubes </a:t>
-            </a:r>
-            <a:r>
-              <a:rPr lang="nl-NL" dirty="0" err="1">
-                <a:latin typeface="Arial"/>
-                <a:cs typeface="Arial"/>
-              </a:rPr>
-              <a:t>toxicity</a:t>
-            </a:r>
-            <a:endParaRPr lang="nl-NL" dirty="0" err="1"/>
+              <a:t>Aspect ratio</a:t>
+            </a:r>
+            <a:endParaRPr lang="nl-NL" dirty="0"/>
           </a:p>
         </p:txBody>
       </p:sp>
     </p:spTree>
     <p:extLst>
       <p:ext uri="{BB962C8B-B14F-4D97-AF65-F5344CB8AC3E}">
-        <p14:creationId xmlns:p14="http://schemas.microsoft.com/office/powerpoint/2010/main" val="2378055094"/>
+        <p14:creationId xmlns:p14="http://schemas.microsoft.com/office/powerpoint/2010/main" val="4263617995"/>
       </p:ext>
     </p:extLst>
   </p:cSld>
@@ -9804,6 +10134,161 @@
           <p:cNvPr id="2" name="Tijdelijke aanduiding voor inhoud 1">
             <a:extLst>
               <a:ext uri="{FF2B5EF4-FFF2-40B4-BE49-F238E27FC236}">
+                <a16:creationId xmlns:a16="http://schemas.microsoft.com/office/drawing/2014/main" id="{1D154430-BEF3-4E06-8F0F-0103FC5AE3D5}"/>
+              </a:ext>
+            </a:extLst>
+          </p:cNvPr>
+          <p:cNvSpPr>
+            <a:spLocks noGrp="1"/>
+          </p:cNvSpPr>
+          <p:nvPr>
+            <p:ph idx="1"/>
+          </p:nvPr>
+        </p:nvSpPr>
+        <p:spPr/>
+        <p:txBody>
+          <a:bodyPr vert="horz" lIns="91440" tIns="45720" rIns="91440" bIns="45720" rtlCol="0" anchor="t">
+            <a:normAutofit/>
+          </a:bodyPr>
+          <a:lstStyle/>
+          <a:p>
+            <a:endParaRPr lang="nl-NL" dirty="0">
+              <a:cs typeface="Arial"/>
+            </a:endParaRPr>
+          </a:p>
+        </p:txBody>
+      </p:sp>
+      <p:sp>
+        <p:nvSpPr>
+          <p:cNvPr id="3" name="Tijdelijke aanduiding voor voettekst 2">
+            <a:extLst>
+              <a:ext uri="{FF2B5EF4-FFF2-40B4-BE49-F238E27FC236}">
+                <a16:creationId xmlns:a16="http://schemas.microsoft.com/office/drawing/2014/main" id="{D675B85F-3EDA-4A13-B39F-123D17144CAB}"/>
+              </a:ext>
+            </a:extLst>
+          </p:cNvPr>
+          <p:cNvSpPr>
+            <a:spLocks noGrp="1"/>
+          </p:cNvSpPr>
+          <p:nvPr>
+            <p:ph type="ftr" sz="quarter" idx="11"/>
+          </p:nvPr>
+        </p:nvSpPr>
+        <p:spPr/>
+        <p:txBody>
+          <a:bodyPr/>
+          <a:lstStyle/>
+          <a:p>
+            <a:r>
+              <a:rPr lang="nl-NL"/>
+              <a:t>Faculteit, departement, dienst …</a:t>
+            </a:r>
+          </a:p>
+        </p:txBody>
+      </p:sp>
+      <p:sp>
+        <p:nvSpPr>
+          <p:cNvPr id="4" name="Tijdelijke aanduiding voor dianummer 3">
+            <a:extLst>
+              <a:ext uri="{FF2B5EF4-FFF2-40B4-BE49-F238E27FC236}">
+                <a16:creationId xmlns:a16="http://schemas.microsoft.com/office/drawing/2014/main" id="{A36FD602-DA2B-4444-9055-A8FA61CA3158}"/>
+              </a:ext>
+            </a:extLst>
+          </p:cNvPr>
+          <p:cNvSpPr>
+            <a:spLocks noGrp="1"/>
+          </p:cNvSpPr>
+          <p:nvPr>
+            <p:ph type="sldNum" sz="quarter" idx="12"/>
+          </p:nvPr>
+        </p:nvSpPr>
+        <p:spPr/>
+        <p:txBody>
+          <a:bodyPr/>
+          <a:lstStyle/>
+          <a:p>
+            <a:fld id="{0A297500-7527-634B-90F4-69D0994C32B4}" type="slidenum">
+              <a:rPr lang="nl-NL" smtClean="0"/>
+              <a:t>18</a:t>
+            </a:fld>
+            <a:endParaRPr lang="nl-NL"/>
+          </a:p>
+        </p:txBody>
+      </p:sp>
+      <p:sp>
+        <p:nvSpPr>
+          <p:cNvPr id="5" name="Titel 4">
+            <a:extLst>
+              <a:ext uri="{FF2B5EF4-FFF2-40B4-BE49-F238E27FC236}">
+                <a16:creationId xmlns:a16="http://schemas.microsoft.com/office/drawing/2014/main" id="{5FC96F9B-0EAB-4D46-8ACB-5E9AB3D673FD}"/>
+              </a:ext>
+            </a:extLst>
+          </p:cNvPr>
+          <p:cNvSpPr>
+            <a:spLocks noGrp="1"/>
+          </p:cNvSpPr>
+          <p:nvPr>
+            <p:ph type="title"/>
+          </p:nvPr>
+        </p:nvSpPr>
+        <p:spPr/>
+        <p:txBody>
+          <a:bodyPr/>
+          <a:lstStyle/>
+          <a:p>
+            <a:r>
+              <a:rPr lang="nl-NL" dirty="0">
+                <a:latin typeface="Arial"/>
+                <a:cs typeface="Arial"/>
+              </a:rPr>
+              <a:t>Carbon nanotubes </a:t>
+            </a:r>
+            <a:r>
+              <a:rPr lang="nl-NL" dirty="0" err="1">
+                <a:latin typeface="Arial"/>
+                <a:cs typeface="Arial"/>
+              </a:rPr>
+              <a:t>toxicity</a:t>
+            </a:r>
+            <a:endParaRPr lang="nl-NL" dirty="0" err="1"/>
+          </a:p>
+        </p:txBody>
+      </p:sp>
+    </p:spTree>
+    <p:extLst>
+      <p:ext uri="{BB962C8B-B14F-4D97-AF65-F5344CB8AC3E}">
+        <p14:creationId xmlns:p14="http://schemas.microsoft.com/office/powerpoint/2010/main" val="2378055094"/>
+      </p:ext>
+    </p:extLst>
+  </p:cSld>
+  <p:clrMapOvr>
+    <a:masterClrMapping/>
+  </p:clrMapOvr>
+</p:sld>
+</file>
+
+<file path=ppt/slides/slide19.xml><?xml version="1.0" encoding="utf-8"?>
+<p:sld xmlns:a="http://schemas.openxmlformats.org/drawingml/2006/main" xmlns:r="http://schemas.openxmlformats.org/officeDocument/2006/relationships" xmlns:p="http://schemas.openxmlformats.org/presentationml/2006/main">
+  <p:cSld>
+    <p:spTree>
+      <p:nvGrpSpPr>
+        <p:cNvPr id="1" name=""/>
+        <p:cNvGrpSpPr/>
+        <p:nvPr/>
+      </p:nvGrpSpPr>
+      <p:grpSpPr>
+        <a:xfrm>
+          <a:off x="0" y="0"/>
+          <a:ext cx="0" cy="0"/>
+          <a:chOff x="0" y="0"/>
+          <a:chExt cx="0" cy="0"/>
+        </a:xfrm>
+      </p:grpSpPr>
+      <p:sp>
+        <p:nvSpPr>
+          <p:cNvPr id="2" name="Tijdelijke aanduiding voor inhoud 1">
+            <a:extLst>
+              <a:ext uri="{FF2B5EF4-FFF2-40B4-BE49-F238E27FC236}">
                 <a16:creationId xmlns:a16="http://schemas.microsoft.com/office/drawing/2014/main" id="{721A5729-C616-4F93-8B09-C92FF8EDF40A}"/>
               </a:ext>
             </a:extLst>
@@ -10188,7 +10673,7 @@
           <a:p>
             <a:fld id="{0A297500-7527-634B-90F4-69D0994C32B4}" type="slidenum">
               <a:rPr lang="nl-NL" smtClean="0"/>
-              <a:t>18</a:t>
+              <a:t>19</a:t>
             </a:fld>
             <a:endParaRPr lang="nl-NL"/>
           </a:p>

</xml_diff>